<commit_message>
Slightly changed the predictions graphs
</commit_message>
<xml_diff>
--- a/modelArchitecture.pptx
+++ b/modelArchitecture.pptx
@@ -263,7 +263,7 @@
           <a:p>
             <a:fld id="{A5D7C484-CE02-754E-A617-F013FA497E0B}" type="datetimeFigureOut">
               <a:rPr lang="en-US" smtClean="0"/>
-              <a:t>3/20/23</a:t>
+              <a:t>4/11/23</a:t>
             </a:fld>
             <a:endParaRPr lang="en-US"/>
           </a:p>
@@ -463,7 +463,7 @@
           <a:p>
             <a:fld id="{A5D7C484-CE02-754E-A617-F013FA497E0B}" type="datetimeFigureOut">
               <a:rPr lang="en-US" smtClean="0"/>
-              <a:t>3/20/23</a:t>
+              <a:t>4/11/23</a:t>
             </a:fld>
             <a:endParaRPr lang="en-US"/>
           </a:p>
@@ -673,7 +673,7 @@
           <a:p>
             <a:fld id="{A5D7C484-CE02-754E-A617-F013FA497E0B}" type="datetimeFigureOut">
               <a:rPr lang="en-US" smtClean="0"/>
-              <a:t>3/20/23</a:t>
+              <a:t>4/11/23</a:t>
             </a:fld>
             <a:endParaRPr lang="en-US"/>
           </a:p>
@@ -873,7 +873,7 @@
           <a:p>
             <a:fld id="{A5D7C484-CE02-754E-A617-F013FA497E0B}" type="datetimeFigureOut">
               <a:rPr lang="en-US" smtClean="0"/>
-              <a:t>3/20/23</a:t>
+              <a:t>4/11/23</a:t>
             </a:fld>
             <a:endParaRPr lang="en-US"/>
           </a:p>
@@ -1149,7 +1149,7 @@
           <a:p>
             <a:fld id="{A5D7C484-CE02-754E-A617-F013FA497E0B}" type="datetimeFigureOut">
               <a:rPr lang="en-US" smtClean="0"/>
-              <a:t>3/20/23</a:t>
+              <a:t>4/11/23</a:t>
             </a:fld>
             <a:endParaRPr lang="en-US"/>
           </a:p>
@@ -1417,7 +1417,7 @@
           <a:p>
             <a:fld id="{A5D7C484-CE02-754E-A617-F013FA497E0B}" type="datetimeFigureOut">
               <a:rPr lang="en-US" smtClean="0"/>
-              <a:t>3/20/23</a:t>
+              <a:t>4/11/23</a:t>
             </a:fld>
             <a:endParaRPr lang="en-US"/>
           </a:p>
@@ -1832,7 +1832,7 @@
           <a:p>
             <a:fld id="{A5D7C484-CE02-754E-A617-F013FA497E0B}" type="datetimeFigureOut">
               <a:rPr lang="en-US" smtClean="0"/>
-              <a:t>3/20/23</a:t>
+              <a:t>4/11/23</a:t>
             </a:fld>
             <a:endParaRPr lang="en-US"/>
           </a:p>
@@ -1974,7 +1974,7 @@
           <a:p>
             <a:fld id="{A5D7C484-CE02-754E-A617-F013FA497E0B}" type="datetimeFigureOut">
               <a:rPr lang="en-US" smtClean="0"/>
-              <a:t>3/20/23</a:t>
+              <a:t>4/11/23</a:t>
             </a:fld>
             <a:endParaRPr lang="en-US"/>
           </a:p>
@@ -2087,7 +2087,7 @@
           <a:p>
             <a:fld id="{A5D7C484-CE02-754E-A617-F013FA497E0B}" type="datetimeFigureOut">
               <a:rPr lang="en-US" smtClean="0"/>
-              <a:t>3/20/23</a:t>
+              <a:t>4/11/23</a:t>
             </a:fld>
             <a:endParaRPr lang="en-US"/>
           </a:p>
@@ -2400,7 +2400,7 @@
           <a:p>
             <a:fld id="{A5D7C484-CE02-754E-A617-F013FA497E0B}" type="datetimeFigureOut">
               <a:rPr lang="en-US" smtClean="0"/>
-              <a:t>3/20/23</a:t>
+              <a:t>4/11/23</a:t>
             </a:fld>
             <a:endParaRPr lang="en-US"/>
           </a:p>
@@ -2689,7 +2689,7 @@
           <a:p>
             <a:fld id="{A5D7C484-CE02-754E-A617-F013FA497E0B}" type="datetimeFigureOut">
               <a:rPr lang="en-US" smtClean="0"/>
-              <a:t>3/20/23</a:t>
+              <a:t>4/11/23</a:t>
             </a:fld>
             <a:endParaRPr lang="en-US"/>
           </a:p>
@@ -2932,7 +2932,7 @@
           <a:p>
             <a:fld id="{A5D7C484-CE02-754E-A617-F013FA497E0B}" type="datetimeFigureOut">
               <a:rPr lang="en-US" smtClean="0"/>
-              <a:t>3/20/23</a:t>
+              <a:t>4/11/23</a:t>
             </a:fld>
             <a:endParaRPr lang="en-US"/>
           </a:p>
@@ -9056,7 +9056,7 @@
             <a:pPr algn="ctr"/>
             <a:r>
               <a:rPr lang="en-US" sz="700" b="1" dirty="0"/>
-              <a:t>padding = "same"</a:t>
+              <a:t>padding = ‘same’</a:t>
             </a:r>
           </a:p>
         </p:txBody>
@@ -9099,7 +9099,7 @@
             <a:pPr algn="ctr"/>
             <a:r>
               <a:rPr lang="en-US" sz="700" b="1" dirty="0"/>
-              <a:t>activation = “tanh”</a:t>
+              <a:t>activation = ‘tanh’</a:t>
             </a:r>
           </a:p>
           <a:p>
@@ -9110,7 +9110,7 @@
             </a:r>
             <a:r>
               <a:rPr lang="en-US" sz="700" b="1" dirty="0"/>
-              <a:t> = False</a:t>
+              <a:t> = True</a:t>
             </a:r>
           </a:p>
           <a:p>
@@ -9121,7 +9121,7 @@
             </a:r>
             <a:r>
               <a:rPr lang="en-US" sz="700" b="1" dirty="0"/>
-              <a:t> = “</a:t>
+              <a:t> = ‘</a:t>
             </a:r>
             <a:r>
               <a:rPr lang="en-US" sz="700" b="1" dirty="0" err="1"/>
@@ -9129,7 +9129,7 @@
             </a:r>
             <a:r>
               <a:rPr lang="en-US" sz="700" b="1" dirty="0"/>
-              <a:t>”</a:t>
+              <a:t>’</a:t>
             </a:r>
           </a:p>
         </p:txBody>
@@ -9208,7 +9208,7 @@
             <a:pPr algn="ctr"/>
             <a:r>
               <a:rPr lang="en-US" sz="700" b="1" dirty="0"/>
-              <a:t>activation = “linear”</a:t>
+              <a:t>activation = ‘linear’</a:t>
             </a:r>
           </a:p>
         </p:txBody>
@@ -9244,7 +9244,7 @@
             <a:pPr algn="ctr"/>
             <a:r>
               <a:rPr lang="en-US" sz="700" b="1" dirty="0"/>
-              <a:t>filters = 32</a:t>
+              <a:t>filters = 64</a:t>
             </a:r>
           </a:p>
           <a:p>
@@ -9255,7 +9255,7 @@
             </a:r>
             <a:r>
               <a:rPr lang="en-US" sz="700" b="1" dirty="0"/>
-              <a:t> = 7</a:t>
+              <a:t> = 5</a:t>
             </a:r>
           </a:p>
           <a:p>
@@ -9269,7 +9269,7 @@
             <a:pPr algn="ctr"/>
             <a:r>
               <a:rPr lang="en-US" sz="700" b="1" dirty="0"/>
-              <a:t>padding = "same"</a:t>
+              <a:t>padding = ‘same’</a:t>
             </a:r>
           </a:p>
         </p:txBody>
@@ -9305,7 +9305,7 @@
             <a:pPr algn="ctr"/>
             <a:r>
               <a:rPr lang="en-US" sz="700" b="1" dirty="0"/>
-              <a:t>filters = 32</a:t>
+              <a:t>filters = 128</a:t>
             </a:r>
           </a:p>
           <a:p>
@@ -9316,7 +9316,7 @@
             </a:r>
             <a:r>
               <a:rPr lang="en-US" sz="700" b="1" dirty="0"/>
-              <a:t> = 7</a:t>
+              <a:t> = 3</a:t>
             </a:r>
           </a:p>
           <a:p>
@@ -9330,7 +9330,7 @@
             <a:pPr algn="ctr"/>
             <a:r>
               <a:rPr lang="en-US" sz="700" b="1" dirty="0"/>
-              <a:t>padding = "same"</a:t>
+              <a:t>padding = ‘same’</a:t>
             </a:r>
           </a:p>
         </p:txBody>
@@ -9660,7 +9660,7 @@
           <a:p>
             <a:r>
               <a:rPr lang="en-US" sz="1027" b="1" dirty="0"/>
-              <a:t>1D Max Pooling</a:t>
+              <a:t>1D max pooling</a:t>
             </a:r>
           </a:p>
         </p:txBody>
@@ -10476,7 +10476,7 @@
           <a:p>
             <a:r>
               <a:rPr lang="en-US" sz="1027" b="1" dirty="0"/>
-              <a:t>1D Max Pooling</a:t>
+              <a:t>1D max pooling</a:t>
             </a:r>
           </a:p>
         </p:txBody>
@@ -10736,7 +10736,7 @@
           <a:p>
             <a:r>
               <a:rPr lang="en-US" sz="1027" b="1" dirty="0"/>
-              <a:t>1D Max Pooling</a:t>
+              <a:t>1D max pooling</a:t>
             </a:r>
           </a:p>
         </p:txBody>
@@ -11207,7 +11207,7 @@
             </a:r>
             <a:r>
               <a:rPr lang="en-US" sz="1027" b="1" dirty="0" err="1"/>
-              <a:t>Normalisation</a:t>
+              <a:t>normalisation</a:t>
             </a:r>
             <a:endParaRPr lang="en-US" sz="1027" b="1" dirty="0"/>
           </a:p>
@@ -11361,13 +11361,16 @@
             <a:pPr algn="ctr"/>
             <a:r>
               <a:rPr lang="en-US" sz="700" b="1" dirty="0"/>
-              <a:t>Activation = </a:t>
+              <a:t>Activation = ‘</a:t>
             </a:r>
             <a:r>
               <a:rPr lang="en-US" sz="700" b="1" dirty="0" err="1"/>
-              <a:t>ReLu</a:t>
-            </a:r>
-            <a:endParaRPr lang="en-US" sz="700" b="1" dirty="0"/>
+              <a:t>relu</a:t>
+            </a:r>
+            <a:r>
+              <a:rPr lang="en-US" sz="700" b="1" dirty="0"/>
+              <a:t>’</a:t>
+            </a:r>
           </a:p>
         </p:txBody>
       </p:sp>

</xml_diff>

<commit_message>
Updated the data splits graphs
</commit_message>
<xml_diff>
--- a/modelArchitecture.pptx
+++ b/modelArchitecture.pptx
@@ -8,6 +8,7 @@
     <p:sldId id="258" r:id="rId2"/>
     <p:sldId id="259" r:id="rId3"/>
     <p:sldId id="260" r:id="rId4"/>
+    <p:sldId id="261" r:id="rId5"/>
   </p:sldIdLst>
   <p:sldSz cx="12192000" cy="6858000"/>
   <p:notesSz cx="6858000" cy="9144000"/>
@@ -263,7 +264,7 @@
           <a:p>
             <a:fld id="{A5D7C484-CE02-754E-A617-F013FA497E0B}" type="datetimeFigureOut">
               <a:rPr lang="en-US" smtClean="0"/>
-              <a:t>4/11/23</a:t>
+              <a:t>5/1/23</a:t>
             </a:fld>
             <a:endParaRPr lang="en-US"/>
           </a:p>
@@ -463,7 +464,7 @@
           <a:p>
             <a:fld id="{A5D7C484-CE02-754E-A617-F013FA497E0B}" type="datetimeFigureOut">
               <a:rPr lang="en-US" smtClean="0"/>
-              <a:t>4/11/23</a:t>
+              <a:t>5/1/23</a:t>
             </a:fld>
             <a:endParaRPr lang="en-US"/>
           </a:p>
@@ -673,7 +674,7 @@
           <a:p>
             <a:fld id="{A5D7C484-CE02-754E-A617-F013FA497E0B}" type="datetimeFigureOut">
               <a:rPr lang="en-US" smtClean="0"/>
-              <a:t>4/11/23</a:t>
+              <a:t>5/1/23</a:t>
             </a:fld>
             <a:endParaRPr lang="en-US"/>
           </a:p>
@@ -873,7 +874,7 @@
           <a:p>
             <a:fld id="{A5D7C484-CE02-754E-A617-F013FA497E0B}" type="datetimeFigureOut">
               <a:rPr lang="en-US" smtClean="0"/>
-              <a:t>4/11/23</a:t>
+              <a:t>5/1/23</a:t>
             </a:fld>
             <a:endParaRPr lang="en-US"/>
           </a:p>
@@ -1149,7 +1150,7 @@
           <a:p>
             <a:fld id="{A5D7C484-CE02-754E-A617-F013FA497E0B}" type="datetimeFigureOut">
               <a:rPr lang="en-US" smtClean="0"/>
-              <a:t>4/11/23</a:t>
+              <a:t>5/1/23</a:t>
             </a:fld>
             <a:endParaRPr lang="en-US"/>
           </a:p>
@@ -1417,7 +1418,7 @@
           <a:p>
             <a:fld id="{A5D7C484-CE02-754E-A617-F013FA497E0B}" type="datetimeFigureOut">
               <a:rPr lang="en-US" smtClean="0"/>
-              <a:t>4/11/23</a:t>
+              <a:t>5/1/23</a:t>
             </a:fld>
             <a:endParaRPr lang="en-US"/>
           </a:p>
@@ -1832,7 +1833,7 @@
           <a:p>
             <a:fld id="{A5D7C484-CE02-754E-A617-F013FA497E0B}" type="datetimeFigureOut">
               <a:rPr lang="en-US" smtClean="0"/>
-              <a:t>4/11/23</a:t>
+              <a:t>5/1/23</a:t>
             </a:fld>
             <a:endParaRPr lang="en-US"/>
           </a:p>
@@ -1974,7 +1975,7 @@
           <a:p>
             <a:fld id="{A5D7C484-CE02-754E-A617-F013FA497E0B}" type="datetimeFigureOut">
               <a:rPr lang="en-US" smtClean="0"/>
-              <a:t>4/11/23</a:t>
+              <a:t>5/1/23</a:t>
             </a:fld>
             <a:endParaRPr lang="en-US"/>
           </a:p>
@@ -2087,7 +2088,7 @@
           <a:p>
             <a:fld id="{A5D7C484-CE02-754E-A617-F013FA497E0B}" type="datetimeFigureOut">
               <a:rPr lang="en-US" smtClean="0"/>
-              <a:t>4/11/23</a:t>
+              <a:t>5/1/23</a:t>
             </a:fld>
             <a:endParaRPr lang="en-US"/>
           </a:p>
@@ -2400,7 +2401,7 @@
           <a:p>
             <a:fld id="{A5D7C484-CE02-754E-A617-F013FA497E0B}" type="datetimeFigureOut">
               <a:rPr lang="en-US" smtClean="0"/>
-              <a:t>4/11/23</a:t>
+              <a:t>5/1/23</a:t>
             </a:fld>
             <a:endParaRPr lang="en-US"/>
           </a:p>
@@ -2689,7 +2690,7 @@
           <a:p>
             <a:fld id="{A5D7C484-CE02-754E-A617-F013FA497E0B}" type="datetimeFigureOut">
               <a:rPr lang="en-US" smtClean="0"/>
-              <a:t>4/11/23</a:t>
+              <a:t>5/1/23</a:t>
             </a:fld>
             <a:endParaRPr lang="en-US"/>
           </a:p>
@@ -2932,7 +2933,7 @@
           <a:p>
             <a:fld id="{A5D7C484-CE02-754E-A617-F013FA497E0B}" type="datetimeFigureOut">
               <a:rPr lang="en-US" smtClean="0"/>
-              <a:t>4/11/23</a:t>
+              <a:t>5/1/23</a:t>
             </a:fld>
             <a:endParaRPr lang="en-US"/>
           </a:p>
@@ -10030,7 +10031,7 @@
             <a:pPr algn="ctr"/>
             <a:r>
               <a:rPr lang="en-US" sz="700" b="1" dirty="0"/>
-              <a:t>Default hyperparameters</a:t>
+              <a:t>default hyperparameters</a:t>
             </a:r>
           </a:p>
         </p:txBody>
@@ -11244,7 +11245,7 @@
             <a:pPr algn="ctr"/>
             <a:r>
               <a:rPr lang="en-US" sz="700" b="1" dirty="0"/>
-              <a:t>Default hyperparameters</a:t>
+              <a:t>default hyperparameters</a:t>
             </a:r>
           </a:p>
         </p:txBody>
@@ -11361,7 +11362,7 @@
             <a:pPr algn="ctr"/>
             <a:r>
               <a:rPr lang="en-US" sz="700" b="1" dirty="0"/>
-              <a:t>Activation = ‘</a:t>
+              <a:t>activation = ‘</a:t>
             </a:r>
             <a:r>
               <a:rPr lang="en-US" sz="700" b="1" dirty="0" err="1"/>
@@ -11503,6 +11504,3116 @@
     <p:extLst>
       <p:ext uri="{BB962C8B-B14F-4D97-AF65-F5344CB8AC3E}">
         <p14:creationId xmlns:p14="http://schemas.microsoft.com/office/powerpoint/2010/main" val="2189406177"/>
+      </p:ext>
+    </p:extLst>
+  </p:cSld>
+  <p:clrMapOvr>
+    <a:masterClrMapping/>
+  </p:clrMapOvr>
+</p:sld>
+</file>
+
+<file path=ppt/slides/slide4.xml><?xml version="1.0" encoding="utf-8"?>
+<p:sld xmlns:a="http://schemas.openxmlformats.org/drawingml/2006/main" xmlns:r="http://schemas.openxmlformats.org/officeDocument/2006/relationships" xmlns:p="http://schemas.openxmlformats.org/presentationml/2006/main">
+  <p:cSld>
+    <p:spTree>
+      <p:nvGrpSpPr>
+        <p:cNvPr id="1" name=""/>
+        <p:cNvGrpSpPr/>
+        <p:nvPr/>
+      </p:nvGrpSpPr>
+      <p:grpSpPr>
+        <a:xfrm>
+          <a:off x="0" y="0"/>
+          <a:ext cx="0" cy="0"/>
+          <a:chOff x="0" y="0"/>
+          <a:chExt cx="0" cy="0"/>
+        </a:xfrm>
+      </p:grpSpPr>
+      <p:sp>
+        <p:nvSpPr>
+          <p:cNvPr id="2" name="Rounded Rectangle 1">
+            <a:extLst>
+              <a:ext uri="{FF2B5EF4-FFF2-40B4-BE49-F238E27FC236}">
+                <a16:creationId xmlns:a16="http://schemas.microsoft.com/office/drawing/2014/main" id="{38FDF734-1312-A115-D493-5D855A5F6725}"/>
+              </a:ext>
+            </a:extLst>
+          </p:cNvPr>
+          <p:cNvSpPr/>
+          <p:nvPr/>
+        </p:nvSpPr>
+        <p:spPr>
+          <a:xfrm>
+            <a:off x="922006" y="1017334"/>
+            <a:ext cx="1190624" cy="800099"/>
+          </a:xfrm>
+          <a:prstGeom prst="roundRect">
+            <a:avLst/>
+          </a:prstGeom>
+        </p:spPr>
+        <p:style>
+          <a:lnRef idx="2">
+            <a:schemeClr val="accent5">
+              <a:shade val="50000"/>
+            </a:schemeClr>
+          </a:lnRef>
+          <a:fillRef idx="1">
+            <a:schemeClr val="accent5"/>
+          </a:fillRef>
+          <a:effectRef idx="0">
+            <a:schemeClr val="accent5"/>
+          </a:effectRef>
+          <a:fontRef idx="minor">
+            <a:schemeClr val="lt1"/>
+          </a:fontRef>
+        </p:style>
+        <p:txBody>
+          <a:bodyPr rtlCol="0" anchor="ctr"/>
+          <a:lstStyle/>
+          <a:p>
+            <a:pPr algn="ctr"/>
+            <a:endParaRPr lang="en-US"/>
+          </a:p>
+        </p:txBody>
+      </p:sp>
+      <p:sp>
+        <p:nvSpPr>
+          <p:cNvPr id="4" name="Rounded Rectangle 3">
+            <a:extLst>
+              <a:ext uri="{FF2B5EF4-FFF2-40B4-BE49-F238E27FC236}">
+                <a16:creationId xmlns:a16="http://schemas.microsoft.com/office/drawing/2014/main" id="{0572C218-F4EC-094C-FECF-67A8A0095A60}"/>
+              </a:ext>
+            </a:extLst>
+          </p:cNvPr>
+          <p:cNvSpPr/>
+          <p:nvPr/>
+        </p:nvSpPr>
+        <p:spPr>
+          <a:xfrm>
+            <a:off x="2460026" y="1017574"/>
+            <a:ext cx="1190624" cy="800099"/>
+          </a:xfrm>
+          <a:prstGeom prst="roundRect">
+            <a:avLst/>
+          </a:prstGeom>
+        </p:spPr>
+        <p:style>
+          <a:lnRef idx="2">
+            <a:schemeClr val="accent5">
+              <a:shade val="50000"/>
+            </a:schemeClr>
+          </a:lnRef>
+          <a:fillRef idx="1">
+            <a:schemeClr val="accent5"/>
+          </a:fillRef>
+          <a:effectRef idx="0">
+            <a:schemeClr val="accent5"/>
+          </a:effectRef>
+          <a:fontRef idx="minor">
+            <a:schemeClr val="lt1"/>
+          </a:fontRef>
+        </p:style>
+        <p:txBody>
+          <a:bodyPr rtlCol="0" anchor="ctr"/>
+          <a:lstStyle/>
+          <a:p>
+            <a:pPr algn="ctr"/>
+            <a:endParaRPr lang="en-US"/>
+          </a:p>
+        </p:txBody>
+      </p:sp>
+      <p:sp>
+        <p:nvSpPr>
+          <p:cNvPr id="5" name="Rounded Rectangle 4">
+            <a:extLst>
+              <a:ext uri="{FF2B5EF4-FFF2-40B4-BE49-F238E27FC236}">
+                <a16:creationId xmlns:a16="http://schemas.microsoft.com/office/drawing/2014/main" id="{52315093-0623-FFD1-41BA-82992843FF8D}"/>
+              </a:ext>
+            </a:extLst>
+          </p:cNvPr>
+          <p:cNvSpPr/>
+          <p:nvPr/>
+        </p:nvSpPr>
+        <p:spPr>
+          <a:xfrm>
+            <a:off x="4001863" y="1017813"/>
+            <a:ext cx="1190624" cy="800099"/>
+          </a:xfrm>
+          <a:prstGeom prst="roundRect">
+            <a:avLst/>
+          </a:prstGeom>
+        </p:spPr>
+        <p:style>
+          <a:lnRef idx="2">
+            <a:schemeClr val="accent5">
+              <a:shade val="50000"/>
+            </a:schemeClr>
+          </a:lnRef>
+          <a:fillRef idx="1">
+            <a:schemeClr val="accent5"/>
+          </a:fillRef>
+          <a:effectRef idx="0">
+            <a:schemeClr val="accent5"/>
+          </a:effectRef>
+          <a:fontRef idx="minor">
+            <a:schemeClr val="lt1"/>
+          </a:fontRef>
+        </p:style>
+        <p:txBody>
+          <a:bodyPr rtlCol="0" anchor="ctr"/>
+          <a:lstStyle/>
+          <a:p>
+            <a:pPr algn="ctr"/>
+            <a:endParaRPr lang="en-US"/>
+          </a:p>
+        </p:txBody>
+      </p:sp>
+      <p:sp>
+        <p:nvSpPr>
+          <p:cNvPr id="6" name="Rounded Rectangle 5">
+            <a:extLst>
+              <a:ext uri="{FF2B5EF4-FFF2-40B4-BE49-F238E27FC236}">
+                <a16:creationId xmlns:a16="http://schemas.microsoft.com/office/drawing/2014/main" id="{B72E4133-09A6-AE1A-A893-47DCA26836E9}"/>
+              </a:ext>
+            </a:extLst>
+          </p:cNvPr>
+          <p:cNvSpPr/>
+          <p:nvPr/>
+        </p:nvSpPr>
+        <p:spPr>
+          <a:xfrm>
+            <a:off x="5536749" y="1017812"/>
+            <a:ext cx="1190624" cy="800099"/>
+          </a:xfrm>
+          <a:prstGeom prst="roundRect">
+            <a:avLst/>
+          </a:prstGeom>
+        </p:spPr>
+        <p:style>
+          <a:lnRef idx="2">
+            <a:schemeClr val="accent5">
+              <a:shade val="50000"/>
+            </a:schemeClr>
+          </a:lnRef>
+          <a:fillRef idx="1">
+            <a:schemeClr val="accent5"/>
+          </a:fillRef>
+          <a:effectRef idx="0">
+            <a:schemeClr val="accent5"/>
+          </a:effectRef>
+          <a:fontRef idx="minor">
+            <a:schemeClr val="lt1"/>
+          </a:fontRef>
+        </p:style>
+        <p:txBody>
+          <a:bodyPr rtlCol="0" anchor="ctr"/>
+          <a:lstStyle/>
+          <a:p>
+            <a:pPr algn="ctr"/>
+            <a:endParaRPr lang="en-US"/>
+          </a:p>
+        </p:txBody>
+      </p:sp>
+      <p:sp>
+        <p:nvSpPr>
+          <p:cNvPr id="11" name="TextBox 10">
+            <a:extLst>
+              <a:ext uri="{FF2B5EF4-FFF2-40B4-BE49-F238E27FC236}">
+                <a16:creationId xmlns:a16="http://schemas.microsoft.com/office/drawing/2014/main" id="{2889CD20-5147-5372-6E21-A0BB39667A33}"/>
+              </a:ext>
+            </a:extLst>
+          </p:cNvPr>
+          <p:cNvSpPr txBox="1"/>
+          <p:nvPr/>
+        </p:nvSpPr>
+        <p:spPr>
+          <a:xfrm>
+            <a:off x="1269592" y="1048524"/>
+            <a:ext cx="501728" cy="250390"/>
+          </a:xfrm>
+          <a:prstGeom prst="rect">
+            <a:avLst/>
+          </a:prstGeom>
+          <a:noFill/>
+        </p:spPr>
+        <p:txBody>
+          <a:bodyPr wrap="square" rtlCol="0">
+            <a:spAutoFit/>
+          </a:bodyPr>
+          <a:lstStyle/>
+          <a:p>
+            <a:r>
+              <a:rPr lang="en-US" sz="1027" b="1" dirty="0"/>
+              <a:t>Input</a:t>
+            </a:r>
+          </a:p>
+        </p:txBody>
+      </p:sp>
+      <p:sp>
+        <p:nvSpPr>
+          <p:cNvPr id="12" name="TextBox 11">
+            <a:extLst>
+              <a:ext uri="{FF2B5EF4-FFF2-40B4-BE49-F238E27FC236}">
+                <a16:creationId xmlns:a16="http://schemas.microsoft.com/office/drawing/2014/main" id="{70D92AEF-605F-E437-52E4-5BCD9AC8BC57}"/>
+              </a:ext>
+            </a:extLst>
+          </p:cNvPr>
+          <p:cNvSpPr txBox="1"/>
+          <p:nvPr/>
+        </p:nvSpPr>
+        <p:spPr>
+          <a:xfrm>
+            <a:off x="2502163" y="1047922"/>
+            <a:ext cx="1113301" cy="250390"/>
+          </a:xfrm>
+          <a:prstGeom prst="rect">
+            <a:avLst/>
+          </a:prstGeom>
+          <a:noFill/>
+        </p:spPr>
+        <p:txBody>
+          <a:bodyPr wrap="square" rtlCol="0">
+            <a:spAutoFit/>
+          </a:bodyPr>
+          <a:lstStyle/>
+          <a:p>
+            <a:r>
+              <a:rPr lang="en-US" sz="1027" b="1" dirty="0"/>
+              <a:t>1D convolutional</a:t>
+            </a:r>
+          </a:p>
+        </p:txBody>
+      </p:sp>
+      <p:sp>
+        <p:nvSpPr>
+          <p:cNvPr id="13" name="TextBox 12">
+            <a:extLst>
+              <a:ext uri="{FF2B5EF4-FFF2-40B4-BE49-F238E27FC236}">
+                <a16:creationId xmlns:a16="http://schemas.microsoft.com/office/drawing/2014/main" id="{20D7342D-EC2D-D648-0FE3-2B4679913C14}"/>
+              </a:ext>
+            </a:extLst>
+          </p:cNvPr>
+          <p:cNvSpPr txBox="1"/>
+          <p:nvPr/>
+        </p:nvSpPr>
+        <p:spPr>
+          <a:xfrm>
+            <a:off x="4041621" y="1047922"/>
+            <a:ext cx="1111108" cy="250390"/>
+          </a:xfrm>
+          <a:prstGeom prst="rect">
+            <a:avLst/>
+          </a:prstGeom>
+          <a:noFill/>
+        </p:spPr>
+        <p:txBody>
+          <a:bodyPr wrap="square" rtlCol="0">
+            <a:spAutoFit/>
+          </a:bodyPr>
+          <a:lstStyle/>
+          <a:p>
+            <a:r>
+              <a:rPr lang="en-US" sz="1027" b="1" dirty="0"/>
+              <a:t>1D convolutional</a:t>
+            </a:r>
+          </a:p>
+        </p:txBody>
+      </p:sp>
+      <p:sp>
+        <p:nvSpPr>
+          <p:cNvPr id="14" name="TextBox 13">
+            <a:extLst>
+              <a:ext uri="{FF2B5EF4-FFF2-40B4-BE49-F238E27FC236}">
+                <a16:creationId xmlns:a16="http://schemas.microsoft.com/office/drawing/2014/main" id="{7EB88860-E3B7-1F8C-6A4A-FBA88871E651}"/>
+              </a:ext>
+            </a:extLst>
+          </p:cNvPr>
+          <p:cNvSpPr txBox="1"/>
+          <p:nvPr/>
+        </p:nvSpPr>
+        <p:spPr>
+          <a:xfrm>
+            <a:off x="5580881" y="1043131"/>
+            <a:ext cx="1102351" cy="250390"/>
+          </a:xfrm>
+          <a:prstGeom prst="rect">
+            <a:avLst/>
+          </a:prstGeom>
+          <a:noFill/>
+        </p:spPr>
+        <p:txBody>
+          <a:bodyPr wrap="square" rtlCol="0">
+            <a:spAutoFit/>
+          </a:bodyPr>
+          <a:lstStyle/>
+          <a:p>
+            <a:r>
+              <a:rPr lang="en-US" sz="1027" b="1" dirty="0"/>
+              <a:t>1D convolutional</a:t>
+            </a:r>
+          </a:p>
+        </p:txBody>
+      </p:sp>
+      <p:sp>
+        <p:nvSpPr>
+          <p:cNvPr id="25" name="Rounded Rectangle 24">
+            <a:extLst>
+              <a:ext uri="{FF2B5EF4-FFF2-40B4-BE49-F238E27FC236}">
+                <a16:creationId xmlns:a16="http://schemas.microsoft.com/office/drawing/2014/main" id="{D23A0126-CA9B-9044-48B1-6A28C25E3757}"/>
+              </a:ext>
+            </a:extLst>
+          </p:cNvPr>
+          <p:cNvSpPr/>
+          <p:nvPr/>
+        </p:nvSpPr>
+        <p:spPr>
+          <a:xfrm>
+            <a:off x="8629334" y="1017334"/>
+            <a:ext cx="1190624" cy="800099"/>
+          </a:xfrm>
+          <a:prstGeom prst="roundRect">
+            <a:avLst/>
+          </a:prstGeom>
+        </p:spPr>
+        <p:style>
+          <a:lnRef idx="2">
+            <a:schemeClr val="accent5">
+              <a:shade val="50000"/>
+            </a:schemeClr>
+          </a:lnRef>
+          <a:fillRef idx="1">
+            <a:schemeClr val="accent5"/>
+          </a:fillRef>
+          <a:effectRef idx="0">
+            <a:schemeClr val="accent5"/>
+          </a:effectRef>
+          <a:fontRef idx="minor">
+            <a:schemeClr val="lt1"/>
+          </a:fontRef>
+        </p:style>
+        <p:txBody>
+          <a:bodyPr rtlCol="0" anchor="ctr"/>
+          <a:lstStyle/>
+          <a:p>
+            <a:pPr algn="ctr"/>
+            <a:endParaRPr lang="en-US"/>
+          </a:p>
+        </p:txBody>
+      </p:sp>
+      <p:sp>
+        <p:nvSpPr>
+          <p:cNvPr id="26" name="Rounded Rectangle 25">
+            <a:extLst>
+              <a:ext uri="{FF2B5EF4-FFF2-40B4-BE49-F238E27FC236}">
+                <a16:creationId xmlns:a16="http://schemas.microsoft.com/office/drawing/2014/main" id="{B890AA0E-1186-B442-95EE-A2CCFE1C00BB}"/>
+              </a:ext>
+            </a:extLst>
+          </p:cNvPr>
+          <p:cNvSpPr/>
+          <p:nvPr/>
+        </p:nvSpPr>
+        <p:spPr>
+          <a:xfrm>
+            <a:off x="7071628" y="1017811"/>
+            <a:ext cx="1190624" cy="800099"/>
+          </a:xfrm>
+          <a:prstGeom prst="roundRect">
+            <a:avLst/>
+          </a:prstGeom>
+        </p:spPr>
+        <p:style>
+          <a:lnRef idx="2">
+            <a:schemeClr val="accent5">
+              <a:shade val="50000"/>
+            </a:schemeClr>
+          </a:lnRef>
+          <a:fillRef idx="1">
+            <a:schemeClr val="accent5"/>
+          </a:fillRef>
+          <a:effectRef idx="0">
+            <a:schemeClr val="accent5"/>
+          </a:effectRef>
+          <a:fontRef idx="minor">
+            <a:schemeClr val="lt1"/>
+          </a:fontRef>
+        </p:style>
+        <p:txBody>
+          <a:bodyPr rtlCol="0" anchor="ctr"/>
+          <a:lstStyle/>
+          <a:p>
+            <a:pPr algn="ctr"/>
+            <a:endParaRPr lang="en-US"/>
+          </a:p>
+        </p:txBody>
+      </p:sp>
+      <p:sp>
+        <p:nvSpPr>
+          <p:cNvPr id="28" name="TextBox 27">
+            <a:extLst>
+              <a:ext uri="{FF2B5EF4-FFF2-40B4-BE49-F238E27FC236}">
+                <a16:creationId xmlns:a16="http://schemas.microsoft.com/office/drawing/2014/main" id="{D33A6D7A-F803-F01E-C4E5-2D6D52A9B438}"/>
+              </a:ext>
+            </a:extLst>
+          </p:cNvPr>
+          <p:cNvSpPr txBox="1"/>
+          <p:nvPr/>
+        </p:nvSpPr>
+        <p:spPr>
+          <a:xfrm>
+            <a:off x="7045281" y="1043131"/>
+            <a:ext cx="1233303" cy="250390"/>
+          </a:xfrm>
+          <a:prstGeom prst="rect">
+            <a:avLst/>
+          </a:prstGeom>
+          <a:noFill/>
+        </p:spPr>
+        <p:txBody>
+          <a:bodyPr wrap="square" rtlCol="0">
+            <a:spAutoFit/>
+          </a:bodyPr>
+          <a:lstStyle/>
+          <a:p>
+            <a:pPr algn="ctr"/>
+            <a:r>
+              <a:rPr lang="en-GB" sz="1027" b="1" dirty="0"/>
+              <a:t>Bidirectional LSTM</a:t>
+            </a:r>
+          </a:p>
+        </p:txBody>
+      </p:sp>
+      <p:sp>
+        <p:nvSpPr>
+          <p:cNvPr id="36" name="TextBox 35">
+            <a:extLst>
+              <a:ext uri="{FF2B5EF4-FFF2-40B4-BE49-F238E27FC236}">
+                <a16:creationId xmlns:a16="http://schemas.microsoft.com/office/drawing/2014/main" id="{B655684C-0043-E9EF-144F-B97097536857}"/>
+              </a:ext>
+            </a:extLst>
+          </p:cNvPr>
+          <p:cNvSpPr txBox="1"/>
+          <p:nvPr/>
+        </p:nvSpPr>
+        <p:spPr>
+          <a:xfrm>
+            <a:off x="8945237" y="1042654"/>
+            <a:ext cx="558818" cy="250390"/>
+          </a:xfrm>
+          <a:prstGeom prst="rect">
+            <a:avLst/>
+          </a:prstGeom>
+          <a:noFill/>
+        </p:spPr>
+        <p:txBody>
+          <a:bodyPr wrap="square" rtlCol="0">
+            <a:spAutoFit/>
+          </a:bodyPr>
+          <a:lstStyle/>
+          <a:p>
+            <a:r>
+              <a:rPr lang="en-US" sz="1027" b="1" dirty="0"/>
+              <a:t>Dense</a:t>
+            </a:r>
+          </a:p>
+        </p:txBody>
+      </p:sp>
+      <p:sp>
+        <p:nvSpPr>
+          <p:cNvPr id="37" name="Rounded Rectangle 36">
+            <a:extLst>
+              <a:ext uri="{FF2B5EF4-FFF2-40B4-BE49-F238E27FC236}">
+                <a16:creationId xmlns:a16="http://schemas.microsoft.com/office/drawing/2014/main" id="{9A7CD5B2-CB02-CF9B-B01E-908D4A98C983}"/>
+              </a:ext>
+            </a:extLst>
+          </p:cNvPr>
+          <p:cNvSpPr/>
+          <p:nvPr/>
+        </p:nvSpPr>
+        <p:spPr>
+          <a:xfrm>
+            <a:off x="10171739" y="1017334"/>
+            <a:ext cx="1190624" cy="800099"/>
+          </a:xfrm>
+          <a:prstGeom prst="roundRect">
+            <a:avLst/>
+          </a:prstGeom>
+        </p:spPr>
+        <p:style>
+          <a:lnRef idx="2">
+            <a:schemeClr val="accent5">
+              <a:shade val="50000"/>
+            </a:schemeClr>
+          </a:lnRef>
+          <a:fillRef idx="1">
+            <a:schemeClr val="accent5"/>
+          </a:fillRef>
+          <a:effectRef idx="0">
+            <a:schemeClr val="accent5"/>
+          </a:effectRef>
+          <a:fontRef idx="minor">
+            <a:schemeClr val="lt1"/>
+          </a:fontRef>
+        </p:style>
+        <p:txBody>
+          <a:bodyPr rtlCol="0" anchor="ctr"/>
+          <a:lstStyle/>
+          <a:p>
+            <a:pPr algn="ctr"/>
+            <a:endParaRPr lang="en-US"/>
+          </a:p>
+        </p:txBody>
+      </p:sp>
+      <p:sp>
+        <p:nvSpPr>
+          <p:cNvPr id="42" name="TextBox 41">
+            <a:extLst>
+              <a:ext uri="{FF2B5EF4-FFF2-40B4-BE49-F238E27FC236}">
+                <a16:creationId xmlns:a16="http://schemas.microsoft.com/office/drawing/2014/main" id="{FDFAB5E0-8380-3922-2E76-8D0D5D98DEBC}"/>
+              </a:ext>
+            </a:extLst>
+          </p:cNvPr>
+          <p:cNvSpPr txBox="1"/>
+          <p:nvPr/>
+        </p:nvSpPr>
+        <p:spPr>
+          <a:xfrm>
+            <a:off x="921830" y="1239492"/>
+            <a:ext cx="1190117" cy="200055"/>
+          </a:xfrm>
+          <a:prstGeom prst="rect">
+            <a:avLst/>
+          </a:prstGeom>
+          <a:noFill/>
+        </p:spPr>
+        <p:txBody>
+          <a:bodyPr wrap="square" rtlCol="0">
+            <a:spAutoFit/>
+          </a:bodyPr>
+          <a:lstStyle/>
+          <a:p>
+            <a:pPr algn="ctr"/>
+            <a:r>
+              <a:rPr lang="en-US" sz="700" dirty="0"/>
+              <a:t>shape = (</a:t>
+            </a:r>
+            <a:r>
+              <a:rPr lang="en-US" sz="700" dirty="0" err="1"/>
+              <a:t>window_length</a:t>
+            </a:r>
+            <a:r>
+              <a:rPr lang="en-US" sz="700" dirty="0"/>
+              <a:t>,)</a:t>
+            </a:r>
+          </a:p>
+        </p:txBody>
+      </p:sp>
+      <p:sp>
+        <p:nvSpPr>
+          <p:cNvPr id="43" name="TextBox 42">
+            <a:extLst>
+              <a:ext uri="{FF2B5EF4-FFF2-40B4-BE49-F238E27FC236}">
+                <a16:creationId xmlns:a16="http://schemas.microsoft.com/office/drawing/2014/main" id="{446097FF-B651-D2F9-F7E2-107F22F1B3C4}"/>
+              </a:ext>
+            </a:extLst>
+          </p:cNvPr>
+          <p:cNvSpPr txBox="1"/>
+          <p:nvPr/>
+        </p:nvSpPr>
+        <p:spPr>
+          <a:xfrm>
+            <a:off x="2456209" y="1242112"/>
+            <a:ext cx="1190624" cy="523220"/>
+          </a:xfrm>
+          <a:prstGeom prst="rect">
+            <a:avLst/>
+          </a:prstGeom>
+          <a:noFill/>
+        </p:spPr>
+        <p:txBody>
+          <a:bodyPr wrap="square" rtlCol="0">
+            <a:spAutoFit/>
+          </a:bodyPr>
+          <a:lstStyle/>
+          <a:p>
+            <a:pPr algn="ctr"/>
+            <a:r>
+              <a:rPr lang="en-US" sz="700" dirty="0"/>
+              <a:t>filters = 32</a:t>
+            </a:r>
+          </a:p>
+          <a:p>
+            <a:pPr algn="ctr"/>
+            <a:r>
+              <a:rPr lang="en-US" sz="700" dirty="0" err="1"/>
+              <a:t>kernel_size</a:t>
+            </a:r>
+            <a:r>
+              <a:rPr lang="en-US" sz="700" dirty="0"/>
+              <a:t> = 7</a:t>
+            </a:r>
+          </a:p>
+          <a:p>
+            <a:pPr algn="ctr"/>
+            <a:r>
+              <a:rPr lang="en-US" sz="700" dirty="0"/>
+              <a:t>strides = 1</a:t>
+            </a:r>
+          </a:p>
+          <a:p>
+            <a:pPr algn="ctr"/>
+            <a:r>
+              <a:rPr lang="en-US" sz="700" dirty="0"/>
+              <a:t>padding = ‘same</a:t>
+            </a:r>
+            <a:r>
+              <a:rPr lang="en-US" sz="700" b="1" dirty="0"/>
+              <a:t>’</a:t>
+            </a:r>
+          </a:p>
+        </p:txBody>
+      </p:sp>
+      <p:sp>
+        <p:nvSpPr>
+          <p:cNvPr id="46" name="TextBox 45">
+            <a:extLst>
+              <a:ext uri="{FF2B5EF4-FFF2-40B4-BE49-F238E27FC236}">
+                <a16:creationId xmlns:a16="http://schemas.microsoft.com/office/drawing/2014/main" id="{B6D5D747-D2E7-AC28-6BDF-C3C8D2470972}"/>
+              </a:ext>
+            </a:extLst>
+          </p:cNvPr>
+          <p:cNvSpPr txBox="1"/>
+          <p:nvPr/>
+        </p:nvSpPr>
+        <p:spPr>
+          <a:xfrm>
+            <a:off x="7064663" y="1243991"/>
+            <a:ext cx="1190624" cy="538609"/>
+          </a:xfrm>
+          <a:prstGeom prst="rect">
+            <a:avLst/>
+          </a:prstGeom>
+          <a:noFill/>
+        </p:spPr>
+        <p:txBody>
+          <a:bodyPr wrap="square" rtlCol="0">
+            <a:spAutoFit/>
+          </a:bodyPr>
+          <a:lstStyle/>
+          <a:p>
+            <a:pPr algn="ctr"/>
+            <a:r>
+              <a:rPr lang="en-US" sz="700" dirty="0"/>
+              <a:t>units = 128</a:t>
+            </a:r>
+          </a:p>
+          <a:p>
+            <a:pPr algn="ctr"/>
+            <a:r>
+              <a:rPr lang="en-US" sz="700" dirty="0"/>
+              <a:t>activation = ‘tanh’</a:t>
+            </a:r>
+          </a:p>
+          <a:p>
+            <a:pPr algn="ctr"/>
+            <a:r>
+              <a:rPr lang="en-US" sz="700" dirty="0" err="1"/>
+              <a:t>return_sequences</a:t>
+            </a:r>
+            <a:r>
+              <a:rPr lang="en-US" sz="700" dirty="0"/>
+              <a:t> = True</a:t>
+            </a:r>
+          </a:p>
+          <a:p>
+            <a:pPr algn="ctr"/>
+            <a:r>
+              <a:rPr lang="en-US" sz="700" dirty="0" err="1"/>
+              <a:t>merge_mode</a:t>
+            </a:r>
+            <a:r>
+              <a:rPr lang="en-US" sz="700" dirty="0"/>
+              <a:t> = ‘</a:t>
+            </a:r>
+            <a:r>
+              <a:rPr lang="en-US" sz="700" dirty="0" err="1"/>
+              <a:t>concat</a:t>
+            </a:r>
+            <a:r>
+              <a:rPr lang="en-US" sz="700" dirty="0"/>
+              <a:t>’</a:t>
+            </a:r>
+          </a:p>
+        </p:txBody>
+      </p:sp>
+      <p:sp>
+        <p:nvSpPr>
+          <p:cNvPr id="47" name="TextBox 46">
+            <a:extLst>
+              <a:ext uri="{FF2B5EF4-FFF2-40B4-BE49-F238E27FC236}">
+                <a16:creationId xmlns:a16="http://schemas.microsoft.com/office/drawing/2014/main" id="{EF70E626-9671-B590-0581-FA0A4B404151}"/>
+              </a:ext>
+            </a:extLst>
+          </p:cNvPr>
+          <p:cNvSpPr txBox="1"/>
+          <p:nvPr/>
+        </p:nvSpPr>
+        <p:spPr>
+          <a:xfrm>
+            <a:off x="8629334" y="1239016"/>
+            <a:ext cx="1190624" cy="200055"/>
+          </a:xfrm>
+          <a:prstGeom prst="rect">
+            <a:avLst/>
+          </a:prstGeom>
+          <a:noFill/>
+        </p:spPr>
+        <p:txBody>
+          <a:bodyPr wrap="square" rtlCol="0">
+            <a:spAutoFit/>
+          </a:bodyPr>
+          <a:lstStyle/>
+          <a:p>
+            <a:pPr algn="ctr"/>
+            <a:r>
+              <a:rPr lang="en-US" sz="700" dirty="0"/>
+              <a:t>units = 128</a:t>
+            </a:r>
+          </a:p>
+        </p:txBody>
+      </p:sp>
+      <p:sp>
+        <p:nvSpPr>
+          <p:cNvPr id="48" name="TextBox 47">
+            <a:extLst>
+              <a:ext uri="{FF2B5EF4-FFF2-40B4-BE49-F238E27FC236}">
+                <a16:creationId xmlns:a16="http://schemas.microsoft.com/office/drawing/2014/main" id="{499FDECF-01DF-0213-3FD5-F5BD7A7E4DC1}"/>
+              </a:ext>
+            </a:extLst>
+          </p:cNvPr>
+          <p:cNvSpPr txBox="1"/>
+          <p:nvPr/>
+        </p:nvSpPr>
+        <p:spPr>
+          <a:xfrm>
+            <a:off x="10171738" y="1239252"/>
+            <a:ext cx="1190624" cy="307777"/>
+          </a:xfrm>
+          <a:prstGeom prst="rect">
+            <a:avLst/>
+          </a:prstGeom>
+          <a:noFill/>
+        </p:spPr>
+        <p:txBody>
+          <a:bodyPr wrap="square" rtlCol="0">
+            <a:spAutoFit/>
+          </a:bodyPr>
+          <a:lstStyle/>
+          <a:p>
+            <a:pPr algn="ctr"/>
+            <a:r>
+              <a:rPr lang="en-US" sz="700" dirty="0"/>
+              <a:t>units = 1</a:t>
+            </a:r>
+          </a:p>
+          <a:p>
+            <a:pPr algn="ctr"/>
+            <a:r>
+              <a:rPr lang="en-US" sz="700" dirty="0"/>
+              <a:t>activation = ‘linear’</a:t>
+            </a:r>
+          </a:p>
+        </p:txBody>
+      </p:sp>
+      <p:sp>
+        <p:nvSpPr>
+          <p:cNvPr id="49" name="TextBox 48">
+            <a:extLst>
+              <a:ext uri="{FF2B5EF4-FFF2-40B4-BE49-F238E27FC236}">
+                <a16:creationId xmlns:a16="http://schemas.microsoft.com/office/drawing/2014/main" id="{42189656-7C7F-8851-27E1-7927C12A3E2E}"/>
+              </a:ext>
+            </a:extLst>
+          </p:cNvPr>
+          <p:cNvSpPr txBox="1"/>
+          <p:nvPr/>
+        </p:nvSpPr>
+        <p:spPr>
+          <a:xfrm>
+            <a:off x="4001825" y="1242112"/>
+            <a:ext cx="1190624" cy="523220"/>
+          </a:xfrm>
+          <a:prstGeom prst="rect">
+            <a:avLst/>
+          </a:prstGeom>
+          <a:noFill/>
+        </p:spPr>
+        <p:txBody>
+          <a:bodyPr wrap="square" rtlCol="0">
+            <a:spAutoFit/>
+          </a:bodyPr>
+          <a:lstStyle/>
+          <a:p>
+            <a:pPr algn="ctr"/>
+            <a:r>
+              <a:rPr lang="en-US" sz="700" dirty="0"/>
+              <a:t>filters = 64</a:t>
+            </a:r>
+          </a:p>
+          <a:p>
+            <a:pPr algn="ctr"/>
+            <a:r>
+              <a:rPr lang="en-US" sz="700" dirty="0" err="1"/>
+              <a:t>kernel_size</a:t>
+            </a:r>
+            <a:r>
+              <a:rPr lang="en-US" sz="700" dirty="0"/>
+              <a:t> = 5</a:t>
+            </a:r>
+          </a:p>
+          <a:p>
+            <a:pPr algn="ctr"/>
+            <a:r>
+              <a:rPr lang="en-US" sz="700" dirty="0"/>
+              <a:t>strides = 1</a:t>
+            </a:r>
+          </a:p>
+          <a:p>
+            <a:pPr algn="ctr"/>
+            <a:r>
+              <a:rPr lang="en-US" sz="700" dirty="0"/>
+              <a:t>padding = ‘same’</a:t>
+            </a:r>
+          </a:p>
+        </p:txBody>
+      </p:sp>
+      <p:sp>
+        <p:nvSpPr>
+          <p:cNvPr id="51" name="TextBox 50">
+            <a:extLst>
+              <a:ext uri="{FF2B5EF4-FFF2-40B4-BE49-F238E27FC236}">
+                <a16:creationId xmlns:a16="http://schemas.microsoft.com/office/drawing/2014/main" id="{19C24842-778C-5925-4921-159EFCB76F19}"/>
+              </a:ext>
+            </a:extLst>
+          </p:cNvPr>
+          <p:cNvSpPr txBox="1"/>
+          <p:nvPr/>
+        </p:nvSpPr>
+        <p:spPr>
+          <a:xfrm>
+            <a:off x="5536739" y="1242112"/>
+            <a:ext cx="1190624" cy="523220"/>
+          </a:xfrm>
+          <a:prstGeom prst="rect">
+            <a:avLst/>
+          </a:prstGeom>
+          <a:noFill/>
+        </p:spPr>
+        <p:txBody>
+          <a:bodyPr wrap="square" rtlCol="0">
+            <a:spAutoFit/>
+          </a:bodyPr>
+          <a:lstStyle/>
+          <a:p>
+            <a:pPr algn="ctr"/>
+            <a:r>
+              <a:rPr lang="en-US" sz="700" dirty="0"/>
+              <a:t>filters = 128</a:t>
+            </a:r>
+          </a:p>
+          <a:p>
+            <a:pPr algn="ctr"/>
+            <a:r>
+              <a:rPr lang="en-US" sz="700" dirty="0" err="1"/>
+              <a:t>kernel_size</a:t>
+            </a:r>
+            <a:r>
+              <a:rPr lang="en-US" sz="700" dirty="0"/>
+              <a:t> = 3</a:t>
+            </a:r>
+          </a:p>
+          <a:p>
+            <a:pPr algn="ctr"/>
+            <a:r>
+              <a:rPr lang="en-US" sz="700" dirty="0"/>
+              <a:t>strides = 1</a:t>
+            </a:r>
+          </a:p>
+          <a:p>
+            <a:pPr algn="ctr"/>
+            <a:r>
+              <a:rPr lang="en-US" sz="700" dirty="0"/>
+              <a:t>padding = ‘same’</a:t>
+            </a:r>
+          </a:p>
+        </p:txBody>
+      </p:sp>
+      <p:sp>
+        <p:nvSpPr>
+          <p:cNvPr id="52" name="TextBox 51">
+            <a:extLst>
+              <a:ext uri="{FF2B5EF4-FFF2-40B4-BE49-F238E27FC236}">
+                <a16:creationId xmlns:a16="http://schemas.microsoft.com/office/drawing/2014/main" id="{97D7B41F-B36A-D805-B8FE-61189C1348A3}"/>
+              </a:ext>
+            </a:extLst>
+          </p:cNvPr>
+          <p:cNvSpPr txBox="1"/>
+          <p:nvPr/>
+        </p:nvSpPr>
+        <p:spPr>
+          <a:xfrm>
+            <a:off x="10487641" y="1042891"/>
+            <a:ext cx="558818" cy="250390"/>
+          </a:xfrm>
+          <a:prstGeom prst="rect">
+            <a:avLst/>
+          </a:prstGeom>
+          <a:noFill/>
+        </p:spPr>
+        <p:txBody>
+          <a:bodyPr wrap="square" rtlCol="0">
+            <a:spAutoFit/>
+          </a:bodyPr>
+          <a:lstStyle/>
+          <a:p>
+            <a:r>
+              <a:rPr lang="en-US" sz="1027" b="1" dirty="0"/>
+              <a:t>Dense</a:t>
+            </a:r>
+          </a:p>
+        </p:txBody>
+      </p:sp>
+      <p:sp>
+        <p:nvSpPr>
+          <p:cNvPr id="53" name="Rounded Rectangle 52">
+            <a:extLst>
+              <a:ext uri="{FF2B5EF4-FFF2-40B4-BE49-F238E27FC236}">
+                <a16:creationId xmlns:a16="http://schemas.microsoft.com/office/drawing/2014/main" id="{6C1CA712-7D07-9503-4C3A-86245035761B}"/>
+              </a:ext>
+            </a:extLst>
+          </p:cNvPr>
+          <p:cNvSpPr/>
+          <p:nvPr/>
+        </p:nvSpPr>
+        <p:spPr>
+          <a:xfrm>
+            <a:off x="924067" y="2214803"/>
+            <a:ext cx="1190624" cy="800099"/>
+          </a:xfrm>
+          <a:prstGeom prst="roundRect">
+            <a:avLst/>
+          </a:prstGeom>
+        </p:spPr>
+        <p:style>
+          <a:lnRef idx="2">
+            <a:schemeClr val="accent5">
+              <a:shade val="50000"/>
+            </a:schemeClr>
+          </a:lnRef>
+          <a:fillRef idx="1">
+            <a:schemeClr val="accent5"/>
+          </a:fillRef>
+          <a:effectRef idx="0">
+            <a:schemeClr val="accent5"/>
+          </a:effectRef>
+          <a:fontRef idx="minor">
+            <a:schemeClr val="lt1"/>
+          </a:fontRef>
+        </p:style>
+        <p:txBody>
+          <a:bodyPr rtlCol="0" anchor="ctr"/>
+          <a:lstStyle/>
+          <a:p>
+            <a:pPr algn="ctr"/>
+            <a:endParaRPr lang="en-US"/>
+          </a:p>
+        </p:txBody>
+      </p:sp>
+      <p:sp>
+        <p:nvSpPr>
+          <p:cNvPr id="54" name="TextBox 53">
+            <a:extLst>
+              <a:ext uri="{FF2B5EF4-FFF2-40B4-BE49-F238E27FC236}">
+                <a16:creationId xmlns:a16="http://schemas.microsoft.com/office/drawing/2014/main" id="{567DB49E-3B47-A2BA-7E7E-BD635A026DCA}"/>
+              </a:ext>
+            </a:extLst>
+          </p:cNvPr>
+          <p:cNvSpPr txBox="1"/>
+          <p:nvPr/>
+        </p:nvSpPr>
+        <p:spPr>
+          <a:xfrm>
+            <a:off x="1182563" y="2252795"/>
+            <a:ext cx="669510" cy="250390"/>
+          </a:xfrm>
+          <a:prstGeom prst="rect">
+            <a:avLst/>
+          </a:prstGeom>
+          <a:noFill/>
+        </p:spPr>
+        <p:txBody>
+          <a:bodyPr wrap="square" rtlCol="0">
+            <a:spAutoFit/>
+          </a:bodyPr>
+          <a:lstStyle/>
+          <a:p>
+            <a:r>
+              <a:rPr lang="en-US" sz="1027" b="1" dirty="0"/>
+              <a:t>Reshape</a:t>
+            </a:r>
+          </a:p>
+        </p:txBody>
+      </p:sp>
+      <p:sp>
+        <p:nvSpPr>
+          <p:cNvPr id="55" name="TextBox 54">
+            <a:extLst>
+              <a:ext uri="{FF2B5EF4-FFF2-40B4-BE49-F238E27FC236}">
+                <a16:creationId xmlns:a16="http://schemas.microsoft.com/office/drawing/2014/main" id="{7097910A-415E-414D-53E4-F62341B1BB7E}"/>
+              </a:ext>
+            </a:extLst>
+          </p:cNvPr>
+          <p:cNvSpPr txBox="1"/>
+          <p:nvPr/>
+        </p:nvSpPr>
+        <p:spPr>
+          <a:xfrm>
+            <a:off x="923891" y="2436961"/>
+            <a:ext cx="1190117" cy="307777"/>
+          </a:xfrm>
+          <a:prstGeom prst="rect">
+            <a:avLst/>
+          </a:prstGeom>
+          <a:noFill/>
+        </p:spPr>
+        <p:txBody>
+          <a:bodyPr wrap="square" rtlCol="0">
+            <a:spAutoFit/>
+          </a:bodyPr>
+          <a:lstStyle/>
+          <a:p>
+            <a:pPr algn="ctr"/>
+            <a:r>
+              <a:rPr lang="en-US" sz="700" dirty="0" err="1"/>
+              <a:t>target_shape</a:t>
+            </a:r>
+            <a:r>
+              <a:rPr lang="en-US" sz="700" dirty="0"/>
+              <a:t> = (</a:t>
+            </a:r>
+            <a:r>
+              <a:rPr lang="en-US" sz="700" dirty="0" err="1"/>
+              <a:t>window_length</a:t>
+            </a:r>
+            <a:r>
+              <a:rPr lang="en-US" sz="700" dirty="0"/>
+              <a:t>, 1)</a:t>
+            </a:r>
+          </a:p>
+        </p:txBody>
+      </p:sp>
+      <p:cxnSp>
+        <p:nvCxnSpPr>
+          <p:cNvPr id="57" name="Straight Arrow Connector 56">
+            <a:extLst>
+              <a:ext uri="{FF2B5EF4-FFF2-40B4-BE49-F238E27FC236}">
+                <a16:creationId xmlns:a16="http://schemas.microsoft.com/office/drawing/2014/main" id="{65497300-C4DD-FD0A-1735-83F79A12786D}"/>
+              </a:ext>
+            </a:extLst>
+          </p:cNvPr>
+          <p:cNvCxnSpPr>
+            <a:stCxn id="2" idx="2"/>
+            <a:endCxn id="53" idx="0"/>
+          </p:cNvCxnSpPr>
+          <p:nvPr/>
+        </p:nvCxnSpPr>
+        <p:spPr>
+          <a:xfrm>
+            <a:off x="1517318" y="1817433"/>
+            <a:ext cx="2061" cy="397370"/>
+          </a:xfrm>
+          <a:prstGeom prst="straightConnector1">
+            <a:avLst/>
+          </a:prstGeom>
+          <a:ln>
+            <a:tailEnd type="triangle"/>
+          </a:ln>
+        </p:spPr>
+        <p:style>
+          <a:lnRef idx="3">
+            <a:schemeClr val="dk1"/>
+          </a:lnRef>
+          <a:fillRef idx="0">
+            <a:schemeClr val="dk1"/>
+          </a:fillRef>
+          <a:effectRef idx="2">
+            <a:schemeClr val="dk1"/>
+          </a:effectRef>
+          <a:fontRef idx="minor">
+            <a:schemeClr val="tx1"/>
+          </a:fontRef>
+        </p:style>
+      </p:cxnSp>
+      <p:cxnSp>
+        <p:nvCxnSpPr>
+          <p:cNvPr id="62" name="Curved Connector 61">
+            <a:extLst>
+              <a:ext uri="{FF2B5EF4-FFF2-40B4-BE49-F238E27FC236}">
+                <a16:creationId xmlns:a16="http://schemas.microsoft.com/office/drawing/2014/main" id="{2158C9C7-3803-8894-91C8-32C9138C7707}"/>
+              </a:ext>
+            </a:extLst>
+          </p:cNvPr>
+          <p:cNvCxnSpPr>
+            <a:cxnSpLocks/>
+            <a:stCxn id="53" idx="3"/>
+            <a:endCxn id="43" idx="1"/>
+          </p:cNvCxnSpPr>
+          <p:nvPr/>
+        </p:nvCxnSpPr>
+        <p:spPr>
+          <a:xfrm flipV="1">
+            <a:off x="2114691" y="1503722"/>
+            <a:ext cx="341518" cy="1111131"/>
+          </a:xfrm>
+          <a:prstGeom prst="curvedConnector3">
+            <a:avLst/>
+          </a:prstGeom>
+          <a:ln>
+            <a:tailEnd type="triangle"/>
+          </a:ln>
+        </p:spPr>
+        <p:style>
+          <a:lnRef idx="3">
+            <a:schemeClr val="dk1"/>
+          </a:lnRef>
+          <a:fillRef idx="0">
+            <a:schemeClr val="dk1"/>
+          </a:fillRef>
+          <a:effectRef idx="2">
+            <a:schemeClr val="dk1"/>
+          </a:effectRef>
+          <a:fontRef idx="minor">
+            <a:schemeClr val="tx1"/>
+          </a:fontRef>
+        </p:style>
+      </p:cxnSp>
+      <p:sp>
+        <p:nvSpPr>
+          <p:cNvPr id="80" name="Rounded Rectangle 79">
+            <a:extLst>
+              <a:ext uri="{FF2B5EF4-FFF2-40B4-BE49-F238E27FC236}">
+                <a16:creationId xmlns:a16="http://schemas.microsoft.com/office/drawing/2014/main" id="{DF8D08EA-CBD1-C79D-438A-D3D7755786E1}"/>
+              </a:ext>
+            </a:extLst>
+          </p:cNvPr>
+          <p:cNvSpPr/>
+          <p:nvPr/>
+        </p:nvSpPr>
+        <p:spPr>
+          <a:xfrm>
+            <a:off x="2463686" y="3418435"/>
+            <a:ext cx="1190624" cy="800099"/>
+          </a:xfrm>
+          <a:prstGeom prst="roundRect">
+            <a:avLst/>
+          </a:prstGeom>
+        </p:spPr>
+        <p:style>
+          <a:lnRef idx="2">
+            <a:schemeClr val="accent5">
+              <a:shade val="50000"/>
+            </a:schemeClr>
+          </a:lnRef>
+          <a:fillRef idx="1">
+            <a:schemeClr val="accent5"/>
+          </a:fillRef>
+          <a:effectRef idx="0">
+            <a:schemeClr val="accent5"/>
+          </a:effectRef>
+          <a:fontRef idx="minor">
+            <a:schemeClr val="lt1"/>
+          </a:fontRef>
+        </p:style>
+        <p:txBody>
+          <a:bodyPr rtlCol="0" anchor="ctr"/>
+          <a:lstStyle/>
+          <a:p>
+            <a:pPr algn="ctr"/>
+            <a:endParaRPr lang="en-US"/>
+          </a:p>
+        </p:txBody>
+      </p:sp>
+      <p:sp>
+        <p:nvSpPr>
+          <p:cNvPr id="82" name="TextBox 81">
+            <a:extLst>
+              <a:ext uri="{FF2B5EF4-FFF2-40B4-BE49-F238E27FC236}">
+                <a16:creationId xmlns:a16="http://schemas.microsoft.com/office/drawing/2014/main" id="{15874BB4-3578-490A-C44D-F45FA1B7A517}"/>
+              </a:ext>
+            </a:extLst>
+          </p:cNvPr>
+          <p:cNvSpPr txBox="1"/>
+          <p:nvPr/>
+        </p:nvSpPr>
+        <p:spPr>
+          <a:xfrm>
+            <a:off x="2519891" y="3471310"/>
+            <a:ext cx="1093150" cy="250390"/>
+          </a:xfrm>
+          <a:prstGeom prst="rect">
+            <a:avLst/>
+          </a:prstGeom>
+          <a:noFill/>
+        </p:spPr>
+        <p:txBody>
+          <a:bodyPr wrap="square" rtlCol="0">
+            <a:spAutoFit/>
+          </a:bodyPr>
+          <a:lstStyle/>
+          <a:p>
+            <a:r>
+              <a:rPr lang="en-US" sz="1027" b="1" dirty="0"/>
+              <a:t>1D max pooling</a:t>
+            </a:r>
+          </a:p>
+        </p:txBody>
+      </p:sp>
+      <p:sp>
+        <p:nvSpPr>
+          <p:cNvPr id="83" name="TextBox 82">
+            <a:extLst>
+              <a:ext uri="{FF2B5EF4-FFF2-40B4-BE49-F238E27FC236}">
+                <a16:creationId xmlns:a16="http://schemas.microsoft.com/office/drawing/2014/main" id="{E923BD3E-B2BE-52D3-EED2-5420758F2AB3}"/>
+              </a:ext>
+            </a:extLst>
+          </p:cNvPr>
+          <p:cNvSpPr txBox="1"/>
+          <p:nvPr/>
+        </p:nvSpPr>
+        <p:spPr>
+          <a:xfrm>
+            <a:off x="2463510" y="3640593"/>
+            <a:ext cx="1190117" cy="415498"/>
+          </a:xfrm>
+          <a:prstGeom prst="rect">
+            <a:avLst/>
+          </a:prstGeom>
+          <a:noFill/>
+        </p:spPr>
+        <p:txBody>
+          <a:bodyPr wrap="square" rtlCol="0">
+            <a:spAutoFit/>
+          </a:bodyPr>
+          <a:lstStyle/>
+          <a:p>
+            <a:pPr algn="ctr"/>
+            <a:r>
+              <a:rPr lang="en-US" sz="700" dirty="0" err="1"/>
+              <a:t>pool_size</a:t>
+            </a:r>
+            <a:r>
+              <a:rPr lang="en-US" sz="700" dirty="0"/>
+              <a:t> = 2</a:t>
+            </a:r>
+          </a:p>
+          <a:p>
+            <a:pPr algn="ctr"/>
+            <a:r>
+              <a:rPr lang="en-US" sz="700" dirty="0"/>
+              <a:t>strides = 2</a:t>
+            </a:r>
+          </a:p>
+          <a:p>
+            <a:pPr algn="ctr"/>
+            <a:r>
+              <a:rPr lang="en-US" sz="700" dirty="0"/>
+              <a:t>padding = 'valid'</a:t>
+            </a:r>
+          </a:p>
+        </p:txBody>
+      </p:sp>
+      <p:cxnSp>
+        <p:nvCxnSpPr>
+          <p:cNvPr id="84" name="Straight Arrow Connector 83">
+            <a:extLst>
+              <a:ext uri="{FF2B5EF4-FFF2-40B4-BE49-F238E27FC236}">
+                <a16:creationId xmlns:a16="http://schemas.microsoft.com/office/drawing/2014/main" id="{85755C34-8D6B-B34D-3B35-AA7FE8AF0A80}"/>
+              </a:ext>
+            </a:extLst>
+          </p:cNvPr>
+          <p:cNvCxnSpPr/>
+          <p:nvPr/>
+        </p:nvCxnSpPr>
+        <p:spPr>
+          <a:xfrm>
+            <a:off x="3040408" y="1817433"/>
+            <a:ext cx="2061" cy="397370"/>
+          </a:xfrm>
+          <a:prstGeom prst="straightConnector1">
+            <a:avLst/>
+          </a:prstGeom>
+          <a:ln>
+            <a:tailEnd type="triangle"/>
+          </a:ln>
+        </p:spPr>
+        <p:style>
+          <a:lnRef idx="3">
+            <a:schemeClr val="dk1"/>
+          </a:lnRef>
+          <a:fillRef idx="0">
+            <a:schemeClr val="dk1"/>
+          </a:fillRef>
+          <a:effectRef idx="2">
+            <a:schemeClr val="dk1"/>
+          </a:effectRef>
+          <a:fontRef idx="minor">
+            <a:schemeClr val="tx1"/>
+          </a:fontRef>
+        </p:style>
+      </p:cxnSp>
+      <p:cxnSp>
+        <p:nvCxnSpPr>
+          <p:cNvPr id="86" name="Straight Arrow Connector 85">
+            <a:extLst>
+              <a:ext uri="{FF2B5EF4-FFF2-40B4-BE49-F238E27FC236}">
+                <a16:creationId xmlns:a16="http://schemas.microsoft.com/office/drawing/2014/main" id="{50057DBE-6A76-93CB-FB7E-514DFDD63515}"/>
+              </a:ext>
+            </a:extLst>
+          </p:cNvPr>
+          <p:cNvCxnSpPr/>
+          <p:nvPr/>
+        </p:nvCxnSpPr>
+        <p:spPr>
+          <a:xfrm>
+            <a:off x="3048441" y="3021065"/>
+            <a:ext cx="2061" cy="397370"/>
+          </a:xfrm>
+          <a:prstGeom prst="straightConnector1">
+            <a:avLst/>
+          </a:prstGeom>
+          <a:ln>
+            <a:tailEnd type="triangle"/>
+          </a:ln>
+        </p:spPr>
+        <p:style>
+          <a:lnRef idx="3">
+            <a:schemeClr val="dk1"/>
+          </a:lnRef>
+          <a:fillRef idx="0">
+            <a:schemeClr val="dk1"/>
+          </a:fillRef>
+          <a:effectRef idx="2">
+            <a:schemeClr val="dk1"/>
+          </a:effectRef>
+          <a:fontRef idx="minor">
+            <a:schemeClr val="tx1"/>
+          </a:fontRef>
+        </p:style>
+      </p:cxnSp>
+      <p:cxnSp>
+        <p:nvCxnSpPr>
+          <p:cNvPr id="89" name="Curved Connector 88">
+            <a:extLst>
+              <a:ext uri="{FF2B5EF4-FFF2-40B4-BE49-F238E27FC236}">
+                <a16:creationId xmlns:a16="http://schemas.microsoft.com/office/drawing/2014/main" id="{F090CC3E-1EDB-9E9F-5627-110851FB4911}"/>
+              </a:ext>
+            </a:extLst>
+          </p:cNvPr>
+          <p:cNvCxnSpPr>
+            <a:cxnSpLocks/>
+            <a:stCxn id="80" idx="3"/>
+            <a:endCxn id="49" idx="1"/>
+          </p:cNvCxnSpPr>
+          <p:nvPr/>
+        </p:nvCxnSpPr>
+        <p:spPr>
+          <a:xfrm flipV="1">
+            <a:off x="3654310" y="1503722"/>
+            <a:ext cx="347515" cy="2314763"/>
+          </a:xfrm>
+          <a:prstGeom prst="curvedConnector3">
+            <a:avLst/>
+          </a:prstGeom>
+          <a:ln>
+            <a:tailEnd type="triangle"/>
+          </a:ln>
+        </p:spPr>
+        <p:style>
+          <a:lnRef idx="3">
+            <a:schemeClr val="dk1"/>
+          </a:lnRef>
+          <a:fillRef idx="0">
+            <a:schemeClr val="dk1"/>
+          </a:fillRef>
+          <a:effectRef idx="2">
+            <a:schemeClr val="dk1"/>
+          </a:effectRef>
+          <a:fontRef idx="minor">
+            <a:schemeClr val="tx1"/>
+          </a:fontRef>
+        </p:style>
+      </p:cxnSp>
+      <p:cxnSp>
+        <p:nvCxnSpPr>
+          <p:cNvPr id="99" name="Straight Arrow Connector 98">
+            <a:extLst>
+              <a:ext uri="{FF2B5EF4-FFF2-40B4-BE49-F238E27FC236}">
+                <a16:creationId xmlns:a16="http://schemas.microsoft.com/office/drawing/2014/main" id="{B7EB8CBC-A314-EE1F-6798-4F65FD0F9871}"/>
+              </a:ext>
+            </a:extLst>
+          </p:cNvPr>
+          <p:cNvCxnSpPr/>
+          <p:nvPr/>
+        </p:nvCxnSpPr>
+        <p:spPr>
+          <a:xfrm>
+            <a:off x="4575663" y="1817433"/>
+            <a:ext cx="2061" cy="397370"/>
+          </a:xfrm>
+          <a:prstGeom prst="straightConnector1">
+            <a:avLst/>
+          </a:prstGeom>
+          <a:ln>
+            <a:tailEnd type="triangle"/>
+          </a:ln>
+        </p:spPr>
+        <p:style>
+          <a:lnRef idx="3">
+            <a:schemeClr val="dk1"/>
+          </a:lnRef>
+          <a:fillRef idx="0">
+            <a:schemeClr val="dk1"/>
+          </a:fillRef>
+          <a:effectRef idx="2">
+            <a:schemeClr val="dk1"/>
+          </a:effectRef>
+          <a:fontRef idx="minor">
+            <a:schemeClr val="tx1"/>
+          </a:fontRef>
+        </p:style>
+      </p:cxnSp>
+      <p:cxnSp>
+        <p:nvCxnSpPr>
+          <p:cNvPr id="111" name="Straight Arrow Connector 110">
+            <a:extLst>
+              <a:ext uri="{FF2B5EF4-FFF2-40B4-BE49-F238E27FC236}">
+                <a16:creationId xmlns:a16="http://schemas.microsoft.com/office/drawing/2014/main" id="{45194A50-6334-3E86-DE32-2A221F79D119}"/>
+              </a:ext>
+            </a:extLst>
+          </p:cNvPr>
+          <p:cNvCxnSpPr/>
+          <p:nvPr/>
+        </p:nvCxnSpPr>
+        <p:spPr>
+          <a:xfrm>
+            <a:off x="6109483" y="1817433"/>
+            <a:ext cx="2061" cy="397370"/>
+          </a:xfrm>
+          <a:prstGeom prst="straightConnector1">
+            <a:avLst/>
+          </a:prstGeom>
+          <a:ln>
+            <a:tailEnd type="triangle"/>
+          </a:ln>
+        </p:spPr>
+        <p:style>
+          <a:lnRef idx="3">
+            <a:schemeClr val="dk1"/>
+          </a:lnRef>
+          <a:fillRef idx="0">
+            <a:schemeClr val="dk1"/>
+          </a:fillRef>
+          <a:effectRef idx="2">
+            <a:schemeClr val="dk1"/>
+          </a:effectRef>
+          <a:fontRef idx="minor">
+            <a:schemeClr val="tx1"/>
+          </a:fontRef>
+        </p:style>
+      </p:cxnSp>
+      <p:sp>
+        <p:nvSpPr>
+          <p:cNvPr id="116" name="Rounded Rectangle 115">
+            <a:extLst>
+              <a:ext uri="{FF2B5EF4-FFF2-40B4-BE49-F238E27FC236}">
+                <a16:creationId xmlns:a16="http://schemas.microsoft.com/office/drawing/2014/main" id="{D56CF47A-1E96-1240-E5D7-70E95FA96DB3}"/>
+              </a:ext>
+            </a:extLst>
+          </p:cNvPr>
+          <p:cNvSpPr/>
+          <p:nvPr/>
+        </p:nvSpPr>
+        <p:spPr>
+          <a:xfrm>
+            <a:off x="7089458" y="2214803"/>
+            <a:ext cx="1190624" cy="800099"/>
+          </a:xfrm>
+          <a:prstGeom prst="roundRect">
+            <a:avLst/>
+          </a:prstGeom>
+        </p:spPr>
+        <p:style>
+          <a:lnRef idx="2">
+            <a:schemeClr val="accent5">
+              <a:shade val="50000"/>
+            </a:schemeClr>
+          </a:lnRef>
+          <a:fillRef idx="1">
+            <a:schemeClr val="accent5"/>
+          </a:fillRef>
+          <a:effectRef idx="0">
+            <a:schemeClr val="accent5"/>
+          </a:effectRef>
+          <a:fontRef idx="minor">
+            <a:schemeClr val="lt1"/>
+          </a:fontRef>
+        </p:style>
+        <p:txBody>
+          <a:bodyPr rtlCol="0" anchor="ctr"/>
+          <a:lstStyle/>
+          <a:p>
+            <a:pPr algn="ctr"/>
+            <a:endParaRPr lang="en-US"/>
+          </a:p>
+        </p:txBody>
+      </p:sp>
+      <p:sp>
+        <p:nvSpPr>
+          <p:cNvPr id="117" name="TextBox 116">
+            <a:extLst>
+              <a:ext uri="{FF2B5EF4-FFF2-40B4-BE49-F238E27FC236}">
+                <a16:creationId xmlns:a16="http://schemas.microsoft.com/office/drawing/2014/main" id="{20A64EE9-932C-6104-2C99-E0D3F5B1FEFF}"/>
+              </a:ext>
+            </a:extLst>
+          </p:cNvPr>
+          <p:cNvSpPr txBox="1"/>
+          <p:nvPr/>
+        </p:nvSpPr>
+        <p:spPr>
+          <a:xfrm>
+            <a:off x="7373895" y="2256153"/>
+            <a:ext cx="620890" cy="250390"/>
+          </a:xfrm>
+          <a:prstGeom prst="rect">
+            <a:avLst/>
+          </a:prstGeom>
+          <a:noFill/>
+        </p:spPr>
+        <p:txBody>
+          <a:bodyPr wrap="square" rtlCol="0">
+            <a:spAutoFit/>
+          </a:bodyPr>
+          <a:lstStyle/>
+          <a:p>
+            <a:r>
+              <a:rPr lang="en-US" sz="1027" b="1" dirty="0"/>
+              <a:t>Flatten</a:t>
+            </a:r>
+          </a:p>
+        </p:txBody>
+      </p:sp>
+      <p:sp>
+        <p:nvSpPr>
+          <p:cNvPr id="118" name="TextBox 117">
+            <a:extLst>
+              <a:ext uri="{FF2B5EF4-FFF2-40B4-BE49-F238E27FC236}">
+                <a16:creationId xmlns:a16="http://schemas.microsoft.com/office/drawing/2014/main" id="{EA7CCD5B-8D3B-FED6-4439-365E5BCA1A3C}"/>
+              </a:ext>
+            </a:extLst>
+          </p:cNvPr>
+          <p:cNvSpPr txBox="1"/>
+          <p:nvPr/>
+        </p:nvSpPr>
+        <p:spPr>
+          <a:xfrm>
+            <a:off x="7089282" y="2436961"/>
+            <a:ext cx="1190117" cy="200055"/>
+          </a:xfrm>
+          <a:prstGeom prst="rect">
+            <a:avLst/>
+          </a:prstGeom>
+          <a:noFill/>
+        </p:spPr>
+        <p:txBody>
+          <a:bodyPr wrap="square" rtlCol="0">
+            <a:spAutoFit/>
+          </a:bodyPr>
+          <a:lstStyle/>
+          <a:p>
+            <a:pPr algn="ctr"/>
+            <a:r>
+              <a:rPr lang="en-US" sz="700" dirty="0"/>
+              <a:t>default hyperparameters</a:t>
+            </a:r>
+          </a:p>
+        </p:txBody>
+      </p:sp>
+      <p:cxnSp>
+        <p:nvCxnSpPr>
+          <p:cNvPr id="119" name="Straight Arrow Connector 118">
+            <a:extLst>
+              <a:ext uri="{FF2B5EF4-FFF2-40B4-BE49-F238E27FC236}">
+                <a16:creationId xmlns:a16="http://schemas.microsoft.com/office/drawing/2014/main" id="{853BB641-4B67-26DC-BD45-0359471AED51}"/>
+              </a:ext>
+            </a:extLst>
+          </p:cNvPr>
+          <p:cNvCxnSpPr/>
+          <p:nvPr/>
+        </p:nvCxnSpPr>
+        <p:spPr>
+          <a:xfrm>
+            <a:off x="7671979" y="1817433"/>
+            <a:ext cx="2061" cy="397370"/>
+          </a:xfrm>
+          <a:prstGeom prst="straightConnector1">
+            <a:avLst/>
+          </a:prstGeom>
+          <a:ln>
+            <a:tailEnd type="triangle"/>
+          </a:ln>
+        </p:spPr>
+        <p:style>
+          <a:lnRef idx="3">
+            <a:schemeClr val="dk1"/>
+          </a:lnRef>
+          <a:fillRef idx="0">
+            <a:schemeClr val="dk1"/>
+          </a:fillRef>
+          <a:effectRef idx="2">
+            <a:schemeClr val="dk1"/>
+          </a:effectRef>
+          <a:fontRef idx="minor">
+            <a:schemeClr val="tx1"/>
+          </a:fontRef>
+        </p:style>
+      </p:cxnSp>
+      <p:cxnSp>
+        <p:nvCxnSpPr>
+          <p:cNvPr id="120" name="Curved Connector 119">
+            <a:extLst>
+              <a:ext uri="{FF2B5EF4-FFF2-40B4-BE49-F238E27FC236}">
+                <a16:creationId xmlns:a16="http://schemas.microsoft.com/office/drawing/2014/main" id="{5227AACC-3D9D-CE33-9536-4C23EAF05AB4}"/>
+              </a:ext>
+            </a:extLst>
+          </p:cNvPr>
+          <p:cNvCxnSpPr/>
+          <p:nvPr/>
+        </p:nvCxnSpPr>
+        <p:spPr>
+          <a:xfrm flipV="1">
+            <a:off x="8278584" y="1549048"/>
+            <a:ext cx="341518" cy="1111131"/>
+          </a:xfrm>
+          <a:prstGeom prst="curvedConnector3">
+            <a:avLst/>
+          </a:prstGeom>
+          <a:ln>
+            <a:tailEnd type="triangle"/>
+          </a:ln>
+        </p:spPr>
+        <p:style>
+          <a:lnRef idx="3">
+            <a:schemeClr val="dk1"/>
+          </a:lnRef>
+          <a:fillRef idx="0">
+            <a:schemeClr val="dk1"/>
+          </a:fillRef>
+          <a:effectRef idx="2">
+            <a:schemeClr val="dk1"/>
+          </a:effectRef>
+          <a:fontRef idx="minor">
+            <a:schemeClr val="tx1"/>
+          </a:fontRef>
+        </p:style>
+      </p:cxnSp>
+      <p:sp>
+        <p:nvSpPr>
+          <p:cNvPr id="127" name="Rounded Rectangle 126">
+            <a:extLst>
+              <a:ext uri="{FF2B5EF4-FFF2-40B4-BE49-F238E27FC236}">
+                <a16:creationId xmlns:a16="http://schemas.microsoft.com/office/drawing/2014/main" id="{AEFDD72A-F476-6900-BA7E-D320A20D4509}"/>
+              </a:ext>
+            </a:extLst>
+          </p:cNvPr>
+          <p:cNvSpPr/>
+          <p:nvPr/>
+        </p:nvSpPr>
+        <p:spPr>
+          <a:xfrm>
+            <a:off x="8626406" y="3424126"/>
+            <a:ext cx="1190624" cy="800099"/>
+          </a:xfrm>
+          <a:prstGeom prst="roundRect">
+            <a:avLst/>
+          </a:prstGeom>
+        </p:spPr>
+        <p:style>
+          <a:lnRef idx="2">
+            <a:schemeClr val="accent5">
+              <a:shade val="50000"/>
+            </a:schemeClr>
+          </a:lnRef>
+          <a:fillRef idx="1">
+            <a:schemeClr val="accent5"/>
+          </a:fillRef>
+          <a:effectRef idx="0">
+            <a:schemeClr val="accent5"/>
+          </a:effectRef>
+          <a:fontRef idx="minor">
+            <a:schemeClr val="lt1"/>
+          </a:fontRef>
+        </p:style>
+        <p:txBody>
+          <a:bodyPr rtlCol="0" anchor="ctr"/>
+          <a:lstStyle/>
+          <a:p>
+            <a:pPr algn="ctr"/>
+            <a:endParaRPr lang="en-US"/>
+          </a:p>
+        </p:txBody>
+      </p:sp>
+      <p:sp>
+        <p:nvSpPr>
+          <p:cNvPr id="128" name="TextBox 127">
+            <a:extLst>
+              <a:ext uri="{FF2B5EF4-FFF2-40B4-BE49-F238E27FC236}">
+                <a16:creationId xmlns:a16="http://schemas.microsoft.com/office/drawing/2014/main" id="{D1AD043C-43A7-75D5-FDEC-55F0E77DDB7C}"/>
+              </a:ext>
+            </a:extLst>
+          </p:cNvPr>
+          <p:cNvSpPr txBox="1"/>
+          <p:nvPr/>
+        </p:nvSpPr>
+        <p:spPr>
+          <a:xfrm>
+            <a:off x="8894266" y="3472640"/>
+            <a:ext cx="744431" cy="250390"/>
+          </a:xfrm>
+          <a:prstGeom prst="rect">
+            <a:avLst/>
+          </a:prstGeom>
+          <a:noFill/>
+        </p:spPr>
+        <p:txBody>
+          <a:bodyPr wrap="square" rtlCol="0">
+            <a:spAutoFit/>
+          </a:bodyPr>
+          <a:lstStyle/>
+          <a:p>
+            <a:r>
+              <a:rPr lang="en-US" sz="1027" b="1" dirty="0"/>
+              <a:t>Dropout</a:t>
+            </a:r>
+          </a:p>
+        </p:txBody>
+      </p:sp>
+      <p:sp>
+        <p:nvSpPr>
+          <p:cNvPr id="129" name="TextBox 128">
+            <a:extLst>
+              <a:ext uri="{FF2B5EF4-FFF2-40B4-BE49-F238E27FC236}">
+                <a16:creationId xmlns:a16="http://schemas.microsoft.com/office/drawing/2014/main" id="{7A7CA699-CAE3-CEFA-30C6-01F935FEE2A0}"/>
+              </a:ext>
+            </a:extLst>
+          </p:cNvPr>
+          <p:cNvSpPr txBox="1"/>
+          <p:nvPr/>
+        </p:nvSpPr>
+        <p:spPr>
+          <a:xfrm>
+            <a:off x="8626230" y="3646284"/>
+            <a:ext cx="1190117" cy="200055"/>
+          </a:xfrm>
+          <a:prstGeom prst="rect">
+            <a:avLst/>
+          </a:prstGeom>
+          <a:noFill/>
+        </p:spPr>
+        <p:txBody>
+          <a:bodyPr wrap="square" rtlCol="0">
+            <a:spAutoFit/>
+          </a:bodyPr>
+          <a:lstStyle/>
+          <a:p>
+            <a:pPr algn="ctr"/>
+            <a:r>
+              <a:rPr lang="en-US" sz="700" dirty="0"/>
+              <a:t>rate = 0.5</a:t>
+            </a:r>
+          </a:p>
+        </p:txBody>
+      </p:sp>
+      <p:cxnSp>
+        <p:nvCxnSpPr>
+          <p:cNvPr id="130" name="Straight Arrow Connector 129">
+            <a:extLst>
+              <a:ext uri="{FF2B5EF4-FFF2-40B4-BE49-F238E27FC236}">
+                <a16:creationId xmlns:a16="http://schemas.microsoft.com/office/drawing/2014/main" id="{3DFE8C2A-7DF2-20E8-0BE0-80CB6EC9FBC5}"/>
+              </a:ext>
+            </a:extLst>
+          </p:cNvPr>
+          <p:cNvCxnSpPr/>
+          <p:nvPr/>
+        </p:nvCxnSpPr>
+        <p:spPr>
+          <a:xfrm>
+            <a:off x="9211855" y="1821794"/>
+            <a:ext cx="2061" cy="397370"/>
+          </a:xfrm>
+          <a:prstGeom prst="straightConnector1">
+            <a:avLst/>
+          </a:prstGeom>
+          <a:ln>
+            <a:tailEnd type="triangle"/>
+          </a:ln>
+        </p:spPr>
+        <p:style>
+          <a:lnRef idx="3">
+            <a:schemeClr val="dk1"/>
+          </a:lnRef>
+          <a:fillRef idx="0">
+            <a:schemeClr val="dk1"/>
+          </a:fillRef>
+          <a:effectRef idx="2">
+            <a:schemeClr val="dk1"/>
+          </a:effectRef>
+          <a:fontRef idx="minor">
+            <a:schemeClr val="tx1"/>
+          </a:fontRef>
+        </p:style>
+      </p:cxnSp>
+      <p:cxnSp>
+        <p:nvCxnSpPr>
+          <p:cNvPr id="133" name="Curved Connector 132">
+            <a:extLst>
+              <a:ext uri="{FF2B5EF4-FFF2-40B4-BE49-F238E27FC236}">
+                <a16:creationId xmlns:a16="http://schemas.microsoft.com/office/drawing/2014/main" id="{F8018159-AC41-28AC-AD57-448433D5BD10}"/>
+              </a:ext>
+            </a:extLst>
+          </p:cNvPr>
+          <p:cNvCxnSpPr>
+            <a:cxnSpLocks/>
+            <a:stCxn id="127" idx="3"/>
+            <a:endCxn id="48" idx="1"/>
+          </p:cNvCxnSpPr>
+          <p:nvPr/>
+        </p:nvCxnSpPr>
+        <p:spPr>
+          <a:xfrm flipV="1">
+            <a:off x="9817030" y="1393141"/>
+            <a:ext cx="354708" cy="2431035"/>
+          </a:xfrm>
+          <a:prstGeom prst="curvedConnector3">
+            <a:avLst>
+              <a:gd name="adj1" fmla="val 50000"/>
+            </a:avLst>
+          </a:prstGeom>
+          <a:ln>
+            <a:tailEnd type="triangle"/>
+          </a:ln>
+        </p:spPr>
+        <p:style>
+          <a:lnRef idx="3">
+            <a:schemeClr val="dk1"/>
+          </a:lnRef>
+          <a:fillRef idx="0">
+            <a:schemeClr val="dk1"/>
+          </a:fillRef>
+          <a:effectRef idx="2">
+            <a:schemeClr val="dk1"/>
+          </a:effectRef>
+          <a:fontRef idx="minor">
+            <a:schemeClr val="tx1"/>
+          </a:fontRef>
+        </p:style>
+      </p:cxnSp>
+      <p:sp>
+        <p:nvSpPr>
+          <p:cNvPr id="134" name="Rounded Rectangle 133">
+            <a:extLst>
+              <a:ext uri="{FF2B5EF4-FFF2-40B4-BE49-F238E27FC236}">
+                <a16:creationId xmlns:a16="http://schemas.microsoft.com/office/drawing/2014/main" id="{1E416239-A08A-0A87-C33D-2DE2B3E3BC57}"/>
+              </a:ext>
+            </a:extLst>
+          </p:cNvPr>
+          <p:cNvSpPr/>
+          <p:nvPr/>
+        </p:nvSpPr>
+        <p:spPr>
+          <a:xfrm>
+            <a:off x="2464705" y="2218924"/>
+            <a:ext cx="1190624" cy="800099"/>
+          </a:xfrm>
+          <a:prstGeom prst="roundRect">
+            <a:avLst/>
+          </a:prstGeom>
+        </p:spPr>
+        <p:style>
+          <a:lnRef idx="2">
+            <a:schemeClr val="accent5">
+              <a:shade val="50000"/>
+            </a:schemeClr>
+          </a:lnRef>
+          <a:fillRef idx="1">
+            <a:schemeClr val="accent5"/>
+          </a:fillRef>
+          <a:effectRef idx="0">
+            <a:schemeClr val="accent5"/>
+          </a:effectRef>
+          <a:fontRef idx="minor">
+            <a:schemeClr val="lt1"/>
+          </a:fontRef>
+        </p:style>
+        <p:txBody>
+          <a:bodyPr rtlCol="0" anchor="ctr"/>
+          <a:lstStyle/>
+          <a:p>
+            <a:pPr algn="ctr"/>
+            <a:endParaRPr lang="en-US"/>
+          </a:p>
+        </p:txBody>
+      </p:sp>
+      <p:sp>
+        <p:nvSpPr>
+          <p:cNvPr id="135" name="TextBox 134">
+            <a:extLst>
+              <a:ext uri="{FF2B5EF4-FFF2-40B4-BE49-F238E27FC236}">
+                <a16:creationId xmlns:a16="http://schemas.microsoft.com/office/drawing/2014/main" id="{96CB77EE-E72B-8149-C9AA-267504728081}"/>
+              </a:ext>
+            </a:extLst>
+          </p:cNvPr>
+          <p:cNvSpPr txBox="1"/>
+          <p:nvPr/>
+        </p:nvSpPr>
+        <p:spPr>
+          <a:xfrm>
+            <a:off x="2459303" y="2412071"/>
+            <a:ext cx="1190625" cy="408445"/>
+          </a:xfrm>
+          <a:prstGeom prst="rect">
+            <a:avLst/>
+          </a:prstGeom>
+          <a:noFill/>
+        </p:spPr>
+        <p:txBody>
+          <a:bodyPr wrap="square" rtlCol="0">
+            <a:spAutoFit/>
+          </a:bodyPr>
+          <a:lstStyle/>
+          <a:p>
+            <a:pPr algn="ctr"/>
+            <a:r>
+              <a:rPr lang="en-US" sz="1027" b="1" dirty="0" err="1"/>
+              <a:t>Normalisation</a:t>
+            </a:r>
+            <a:r>
+              <a:rPr lang="en-US" sz="1027" b="1" dirty="0"/>
+              <a:t> block</a:t>
+            </a:r>
+          </a:p>
+        </p:txBody>
+      </p:sp>
+      <p:sp>
+        <p:nvSpPr>
+          <p:cNvPr id="7" name="Rounded Rectangle 6">
+            <a:extLst>
+              <a:ext uri="{FF2B5EF4-FFF2-40B4-BE49-F238E27FC236}">
+                <a16:creationId xmlns:a16="http://schemas.microsoft.com/office/drawing/2014/main" id="{3AC70FC8-B782-A908-59AD-01976ABF6E66}"/>
+              </a:ext>
+            </a:extLst>
+          </p:cNvPr>
+          <p:cNvSpPr/>
+          <p:nvPr/>
+        </p:nvSpPr>
+        <p:spPr>
+          <a:xfrm>
+            <a:off x="3999753" y="3414314"/>
+            <a:ext cx="1190624" cy="800099"/>
+          </a:xfrm>
+          <a:prstGeom prst="roundRect">
+            <a:avLst/>
+          </a:prstGeom>
+        </p:spPr>
+        <p:style>
+          <a:lnRef idx="2">
+            <a:schemeClr val="accent5">
+              <a:shade val="50000"/>
+            </a:schemeClr>
+          </a:lnRef>
+          <a:fillRef idx="1">
+            <a:schemeClr val="accent5"/>
+          </a:fillRef>
+          <a:effectRef idx="0">
+            <a:schemeClr val="accent5"/>
+          </a:effectRef>
+          <a:fontRef idx="minor">
+            <a:schemeClr val="lt1"/>
+          </a:fontRef>
+        </p:style>
+        <p:txBody>
+          <a:bodyPr rtlCol="0" anchor="ctr"/>
+          <a:lstStyle/>
+          <a:p>
+            <a:pPr algn="ctr"/>
+            <a:endParaRPr lang="en-US"/>
+          </a:p>
+        </p:txBody>
+      </p:sp>
+      <p:sp>
+        <p:nvSpPr>
+          <p:cNvPr id="8" name="TextBox 7">
+            <a:extLst>
+              <a:ext uri="{FF2B5EF4-FFF2-40B4-BE49-F238E27FC236}">
+                <a16:creationId xmlns:a16="http://schemas.microsoft.com/office/drawing/2014/main" id="{C101B14E-5394-DF57-8461-329EBFE03158}"/>
+              </a:ext>
+            </a:extLst>
+          </p:cNvPr>
+          <p:cNvSpPr txBox="1"/>
+          <p:nvPr/>
+        </p:nvSpPr>
+        <p:spPr>
+          <a:xfrm>
+            <a:off x="4055958" y="3467189"/>
+            <a:ext cx="1093150" cy="250390"/>
+          </a:xfrm>
+          <a:prstGeom prst="rect">
+            <a:avLst/>
+          </a:prstGeom>
+          <a:noFill/>
+        </p:spPr>
+        <p:txBody>
+          <a:bodyPr wrap="square" rtlCol="0">
+            <a:spAutoFit/>
+          </a:bodyPr>
+          <a:lstStyle/>
+          <a:p>
+            <a:r>
+              <a:rPr lang="en-US" sz="1027" b="1" dirty="0"/>
+              <a:t>1D max pooling</a:t>
+            </a:r>
+          </a:p>
+        </p:txBody>
+      </p:sp>
+      <p:sp>
+        <p:nvSpPr>
+          <p:cNvPr id="9" name="TextBox 8">
+            <a:extLst>
+              <a:ext uri="{FF2B5EF4-FFF2-40B4-BE49-F238E27FC236}">
+                <a16:creationId xmlns:a16="http://schemas.microsoft.com/office/drawing/2014/main" id="{A75B151D-9720-4EF7-CAE6-C907631D38BD}"/>
+              </a:ext>
+            </a:extLst>
+          </p:cNvPr>
+          <p:cNvSpPr txBox="1"/>
+          <p:nvPr/>
+        </p:nvSpPr>
+        <p:spPr>
+          <a:xfrm>
+            <a:off x="3999577" y="3636472"/>
+            <a:ext cx="1190117" cy="415498"/>
+          </a:xfrm>
+          <a:prstGeom prst="rect">
+            <a:avLst/>
+          </a:prstGeom>
+          <a:noFill/>
+        </p:spPr>
+        <p:txBody>
+          <a:bodyPr wrap="square" rtlCol="0">
+            <a:spAutoFit/>
+          </a:bodyPr>
+          <a:lstStyle/>
+          <a:p>
+            <a:pPr algn="ctr"/>
+            <a:r>
+              <a:rPr lang="en-US" sz="700" dirty="0" err="1"/>
+              <a:t>pool_size</a:t>
+            </a:r>
+            <a:r>
+              <a:rPr lang="en-US" sz="700" dirty="0"/>
+              <a:t> = 2</a:t>
+            </a:r>
+          </a:p>
+          <a:p>
+            <a:pPr algn="ctr"/>
+            <a:r>
+              <a:rPr lang="en-US" sz="700" dirty="0"/>
+              <a:t>strides = 2</a:t>
+            </a:r>
+          </a:p>
+          <a:p>
+            <a:pPr algn="ctr"/>
+            <a:r>
+              <a:rPr lang="en-US" sz="700" dirty="0"/>
+              <a:t>padding = 'valid'</a:t>
+            </a:r>
+          </a:p>
+        </p:txBody>
+      </p:sp>
+      <p:cxnSp>
+        <p:nvCxnSpPr>
+          <p:cNvPr id="10" name="Straight Arrow Connector 9">
+            <a:extLst>
+              <a:ext uri="{FF2B5EF4-FFF2-40B4-BE49-F238E27FC236}">
+                <a16:creationId xmlns:a16="http://schemas.microsoft.com/office/drawing/2014/main" id="{FB1ADFFA-DDA6-B9C2-7F1A-0969921D58BA}"/>
+              </a:ext>
+            </a:extLst>
+          </p:cNvPr>
+          <p:cNvCxnSpPr/>
+          <p:nvPr/>
+        </p:nvCxnSpPr>
+        <p:spPr>
+          <a:xfrm>
+            <a:off x="4584508" y="3016944"/>
+            <a:ext cx="2061" cy="397370"/>
+          </a:xfrm>
+          <a:prstGeom prst="straightConnector1">
+            <a:avLst/>
+          </a:prstGeom>
+          <a:ln>
+            <a:tailEnd type="triangle"/>
+          </a:ln>
+        </p:spPr>
+        <p:style>
+          <a:lnRef idx="3">
+            <a:schemeClr val="dk1"/>
+          </a:lnRef>
+          <a:fillRef idx="0">
+            <a:schemeClr val="dk1"/>
+          </a:fillRef>
+          <a:effectRef idx="2">
+            <a:schemeClr val="dk1"/>
+          </a:effectRef>
+          <a:fontRef idx="minor">
+            <a:schemeClr val="tx1"/>
+          </a:fontRef>
+        </p:style>
+      </p:cxnSp>
+      <p:sp>
+        <p:nvSpPr>
+          <p:cNvPr id="15" name="Rounded Rectangle 14">
+            <a:extLst>
+              <a:ext uri="{FF2B5EF4-FFF2-40B4-BE49-F238E27FC236}">
+                <a16:creationId xmlns:a16="http://schemas.microsoft.com/office/drawing/2014/main" id="{32E673D5-BB04-9BE0-89A6-00BCD34C193D}"/>
+              </a:ext>
+            </a:extLst>
+          </p:cNvPr>
+          <p:cNvSpPr/>
+          <p:nvPr/>
+        </p:nvSpPr>
+        <p:spPr>
+          <a:xfrm>
+            <a:off x="4000772" y="2214803"/>
+            <a:ext cx="1190624" cy="800099"/>
+          </a:xfrm>
+          <a:prstGeom prst="roundRect">
+            <a:avLst/>
+          </a:prstGeom>
+        </p:spPr>
+        <p:style>
+          <a:lnRef idx="2">
+            <a:schemeClr val="accent5">
+              <a:shade val="50000"/>
+            </a:schemeClr>
+          </a:lnRef>
+          <a:fillRef idx="1">
+            <a:schemeClr val="accent5"/>
+          </a:fillRef>
+          <a:effectRef idx="0">
+            <a:schemeClr val="accent5"/>
+          </a:effectRef>
+          <a:fontRef idx="minor">
+            <a:schemeClr val="lt1"/>
+          </a:fontRef>
+        </p:style>
+        <p:txBody>
+          <a:bodyPr rtlCol="0" anchor="ctr"/>
+          <a:lstStyle/>
+          <a:p>
+            <a:pPr algn="ctr"/>
+            <a:endParaRPr lang="en-US"/>
+          </a:p>
+        </p:txBody>
+      </p:sp>
+      <p:sp>
+        <p:nvSpPr>
+          <p:cNvPr id="16" name="TextBox 15">
+            <a:extLst>
+              <a:ext uri="{FF2B5EF4-FFF2-40B4-BE49-F238E27FC236}">
+                <a16:creationId xmlns:a16="http://schemas.microsoft.com/office/drawing/2014/main" id="{B8BE2D2A-53E8-D130-E122-2EF4B8DE626F}"/>
+              </a:ext>
+            </a:extLst>
+          </p:cNvPr>
+          <p:cNvSpPr txBox="1"/>
+          <p:nvPr/>
+        </p:nvSpPr>
+        <p:spPr>
+          <a:xfrm>
+            <a:off x="3995370" y="2407950"/>
+            <a:ext cx="1190625" cy="408445"/>
+          </a:xfrm>
+          <a:prstGeom prst="rect">
+            <a:avLst/>
+          </a:prstGeom>
+          <a:noFill/>
+        </p:spPr>
+        <p:txBody>
+          <a:bodyPr wrap="square" rtlCol="0">
+            <a:spAutoFit/>
+          </a:bodyPr>
+          <a:lstStyle/>
+          <a:p>
+            <a:pPr algn="ctr"/>
+            <a:r>
+              <a:rPr lang="en-US" sz="1027" b="1" dirty="0" err="1"/>
+              <a:t>Normalisation</a:t>
+            </a:r>
+            <a:r>
+              <a:rPr lang="en-US" sz="1027" b="1" dirty="0"/>
+              <a:t> block</a:t>
+            </a:r>
+          </a:p>
+        </p:txBody>
+      </p:sp>
+      <p:sp>
+        <p:nvSpPr>
+          <p:cNvPr id="17" name="Rounded Rectangle 16">
+            <a:extLst>
+              <a:ext uri="{FF2B5EF4-FFF2-40B4-BE49-F238E27FC236}">
+                <a16:creationId xmlns:a16="http://schemas.microsoft.com/office/drawing/2014/main" id="{EA321E67-F214-F274-3C3A-E02EA5109689}"/>
+              </a:ext>
+            </a:extLst>
+          </p:cNvPr>
+          <p:cNvSpPr/>
+          <p:nvPr/>
+        </p:nvSpPr>
+        <p:spPr>
+          <a:xfrm>
+            <a:off x="5535331" y="3414314"/>
+            <a:ext cx="1190624" cy="800099"/>
+          </a:xfrm>
+          <a:prstGeom prst="roundRect">
+            <a:avLst/>
+          </a:prstGeom>
+        </p:spPr>
+        <p:style>
+          <a:lnRef idx="2">
+            <a:schemeClr val="accent5">
+              <a:shade val="50000"/>
+            </a:schemeClr>
+          </a:lnRef>
+          <a:fillRef idx="1">
+            <a:schemeClr val="accent5"/>
+          </a:fillRef>
+          <a:effectRef idx="0">
+            <a:schemeClr val="accent5"/>
+          </a:effectRef>
+          <a:fontRef idx="minor">
+            <a:schemeClr val="lt1"/>
+          </a:fontRef>
+        </p:style>
+        <p:txBody>
+          <a:bodyPr rtlCol="0" anchor="ctr"/>
+          <a:lstStyle/>
+          <a:p>
+            <a:pPr algn="ctr"/>
+            <a:endParaRPr lang="en-US"/>
+          </a:p>
+        </p:txBody>
+      </p:sp>
+      <p:sp>
+        <p:nvSpPr>
+          <p:cNvPr id="18" name="TextBox 17">
+            <a:extLst>
+              <a:ext uri="{FF2B5EF4-FFF2-40B4-BE49-F238E27FC236}">
+                <a16:creationId xmlns:a16="http://schemas.microsoft.com/office/drawing/2014/main" id="{366AE286-AA78-2550-FD59-A6434588D9F0}"/>
+              </a:ext>
+            </a:extLst>
+          </p:cNvPr>
+          <p:cNvSpPr txBox="1"/>
+          <p:nvPr/>
+        </p:nvSpPr>
+        <p:spPr>
+          <a:xfrm>
+            <a:off x="5591536" y="3467189"/>
+            <a:ext cx="1093150" cy="250390"/>
+          </a:xfrm>
+          <a:prstGeom prst="rect">
+            <a:avLst/>
+          </a:prstGeom>
+          <a:noFill/>
+        </p:spPr>
+        <p:txBody>
+          <a:bodyPr wrap="square" rtlCol="0">
+            <a:spAutoFit/>
+          </a:bodyPr>
+          <a:lstStyle/>
+          <a:p>
+            <a:r>
+              <a:rPr lang="en-US" sz="1027" b="1" dirty="0"/>
+              <a:t>1D max pooling</a:t>
+            </a:r>
+          </a:p>
+        </p:txBody>
+      </p:sp>
+      <p:sp>
+        <p:nvSpPr>
+          <p:cNvPr id="19" name="TextBox 18">
+            <a:extLst>
+              <a:ext uri="{FF2B5EF4-FFF2-40B4-BE49-F238E27FC236}">
+                <a16:creationId xmlns:a16="http://schemas.microsoft.com/office/drawing/2014/main" id="{AEC6251C-4C22-69F9-A66D-2775939D8DCC}"/>
+              </a:ext>
+            </a:extLst>
+          </p:cNvPr>
+          <p:cNvSpPr txBox="1"/>
+          <p:nvPr/>
+        </p:nvSpPr>
+        <p:spPr>
+          <a:xfrm>
+            <a:off x="5535155" y="3636472"/>
+            <a:ext cx="1190117" cy="415498"/>
+          </a:xfrm>
+          <a:prstGeom prst="rect">
+            <a:avLst/>
+          </a:prstGeom>
+          <a:noFill/>
+        </p:spPr>
+        <p:txBody>
+          <a:bodyPr wrap="square" rtlCol="0">
+            <a:spAutoFit/>
+          </a:bodyPr>
+          <a:lstStyle/>
+          <a:p>
+            <a:pPr algn="ctr"/>
+            <a:r>
+              <a:rPr lang="en-US" sz="700" dirty="0" err="1"/>
+              <a:t>pool_size</a:t>
+            </a:r>
+            <a:r>
+              <a:rPr lang="en-US" sz="700" dirty="0"/>
+              <a:t> = 2</a:t>
+            </a:r>
+          </a:p>
+          <a:p>
+            <a:pPr algn="ctr"/>
+            <a:r>
+              <a:rPr lang="en-US" sz="700" dirty="0"/>
+              <a:t>strides = 2</a:t>
+            </a:r>
+          </a:p>
+          <a:p>
+            <a:pPr algn="ctr"/>
+            <a:r>
+              <a:rPr lang="en-US" sz="700" dirty="0"/>
+              <a:t>padding = 'valid'</a:t>
+            </a:r>
+          </a:p>
+        </p:txBody>
+      </p:sp>
+      <p:cxnSp>
+        <p:nvCxnSpPr>
+          <p:cNvPr id="20" name="Straight Arrow Connector 19">
+            <a:extLst>
+              <a:ext uri="{FF2B5EF4-FFF2-40B4-BE49-F238E27FC236}">
+                <a16:creationId xmlns:a16="http://schemas.microsoft.com/office/drawing/2014/main" id="{A2071614-7DF8-9AB6-11FA-2853E157F5C6}"/>
+              </a:ext>
+            </a:extLst>
+          </p:cNvPr>
+          <p:cNvCxnSpPr/>
+          <p:nvPr/>
+        </p:nvCxnSpPr>
+        <p:spPr>
+          <a:xfrm>
+            <a:off x="6120086" y="3016944"/>
+            <a:ext cx="2061" cy="397370"/>
+          </a:xfrm>
+          <a:prstGeom prst="straightConnector1">
+            <a:avLst/>
+          </a:prstGeom>
+          <a:ln>
+            <a:tailEnd type="triangle"/>
+          </a:ln>
+        </p:spPr>
+        <p:style>
+          <a:lnRef idx="3">
+            <a:schemeClr val="dk1"/>
+          </a:lnRef>
+          <a:fillRef idx="0">
+            <a:schemeClr val="dk1"/>
+          </a:fillRef>
+          <a:effectRef idx="2">
+            <a:schemeClr val="dk1"/>
+          </a:effectRef>
+          <a:fontRef idx="minor">
+            <a:schemeClr val="tx1"/>
+          </a:fontRef>
+        </p:style>
+      </p:cxnSp>
+      <p:sp>
+        <p:nvSpPr>
+          <p:cNvPr id="21" name="Rounded Rectangle 20">
+            <a:extLst>
+              <a:ext uri="{FF2B5EF4-FFF2-40B4-BE49-F238E27FC236}">
+                <a16:creationId xmlns:a16="http://schemas.microsoft.com/office/drawing/2014/main" id="{62DCA89E-5149-22BA-977B-B9669F3BA036}"/>
+              </a:ext>
+            </a:extLst>
+          </p:cNvPr>
+          <p:cNvSpPr/>
+          <p:nvPr/>
+        </p:nvSpPr>
+        <p:spPr>
+          <a:xfrm>
+            <a:off x="5536350" y="2214803"/>
+            <a:ext cx="1190624" cy="800099"/>
+          </a:xfrm>
+          <a:prstGeom prst="roundRect">
+            <a:avLst/>
+          </a:prstGeom>
+        </p:spPr>
+        <p:style>
+          <a:lnRef idx="2">
+            <a:schemeClr val="accent5">
+              <a:shade val="50000"/>
+            </a:schemeClr>
+          </a:lnRef>
+          <a:fillRef idx="1">
+            <a:schemeClr val="accent5"/>
+          </a:fillRef>
+          <a:effectRef idx="0">
+            <a:schemeClr val="accent5"/>
+          </a:effectRef>
+          <a:fontRef idx="minor">
+            <a:schemeClr val="lt1"/>
+          </a:fontRef>
+        </p:style>
+        <p:txBody>
+          <a:bodyPr rtlCol="0" anchor="ctr"/>
+          <a:lstStyle/>
+          <a:p>
+            <a:pPr algn="ctr"/>
+            <a:endParaRPr lang="en-US"/>
+          </a:p>
+        </p:txBody>
+      </p:sp>
+      <p:sp>
+        <p:nvSpPr>
+          <p:cNvPr id="22" name="TextBox 21">
+            <a:extLst>
+              <a:ext uri="{FF2B5EF4-FFF2-40B4-BE49-F238E27FC236}">
+                <a16:creationId xmlns:a16="http://schemas.microsoft.com/office/drawing/2014/main" id="{90151E3D-167F-1B3F-4168-273309285D3D}"/>
+              </a:ext>
+            </a:extLst>
+          </p:cNvPr>
+          <p:cNvSpPr txBox="1"/>
+          <p:nvPr/>
+        </p:nvSpPr>
+        <p:spPr>
+          <a:xfrm>
+            <a:off x="5530948" y="2407950"/>
+            <a:ext cx="1190625" cy="408445"/>
+          </a:xfrm>
+          <a:prstGeom prst="rect">
+            <a:avLst/>
+          </a:prstGeom>
+          <a:noFill/>
+        </p:spPr>
+        <p:txBody>
+          <a:bodyPr wrap="square" rtlCol="0">
+            <a:spAutoFit/>
+          </a:bodyPr>
+          <a:lstStyle/>
+          <a:p>
+            <a:pPr algn="ctr"/>
+            <a:r>
+              <a:rPr lang="en-US" sz="1027" b="1" dirty="0" err="1"/>
+              <a:t>Normalisation</a:t>
+            </a:r>
+            <a:r>
+              <a:rPr lang="en-US" sz="1027" b="1" dirty="0"/>
+              <a:t> block</a:t>
+            </a:r>
+          </a:p>
+        </p:txBody>
+      </p:sp>
+      <p:cxnSp>
+        <p:nvCxnSpPr>
+          <p:cNvPr id="23" name="Curved Connector 22">
+            <a:extLst>
+              <a:ext uri="{FF2B5EF4-FFF2-40B4-BE49-F238E27FC236}">
+                <a16:creationId xmlns:a16="http://schemas.microsoft.com/office/drawing/2014/main" id="{1EE13345-DBDB-678E-D928-903D3F3E9A6A}"/>
+              </a:ext>
+            </a:extLst>
+          </p:cNvPr>
+          <p:cNvCxnSpPr>
+            <a:cxnSpLocks/>
+          </p:cNvCxnSpPr>
+          <p:nvPr/>
+        </p:nvCxnSpPr>
+        <p:spPr>
+          <a:xfrm flipV="1">
+            <a:off x="5188326" y="1499600"/>
+            <a:ext cx="347515" cy="2314763"/>
+          </a:xfrm>
+          <a:prstGeom prst="curvedConnector3">
+            <a:avLst/>
+          </a:prstGeom>
+          <a:ln>
+            <a:tailEnd type="triangle"/>
+          </a:ln>
+        </p:spPr>
+        <p:style>
+          <a:lnRef idx="3">
+            <a:schemeClr val="dk1"/>
+          </a:lnRef>
+          <a:fillRef idx="0">
+            <a:schemeClr val="dk1"/>
+          </a:fillRef>
+          <a:effectRef idx="2">
+            <a:schemeClr val="dk1"/>
+          </a:effectRef>
+          <a:fontRef idx="minor">
+            <a:schemeClr val="tx1"/>
+          </a:fontRef>
+        </p:style>
+      </p:cxnSp>
+      <p:cxnSp>
+        <p:nvCxnSpPr>
+          <p:cNvPr id="24" name="Curved Connector 23">
+            <a:extLst>
+              <a:ext uri="{FF2B5EF4-FFF2-40B4-BE49-F238E27FC236}">
+                <a16:creationId xmlns:a16="http://schemas.microsoft.com/office/drawing/2014/main" id="{3F334DF5-B84F-E4F6-7858-75579261B430}"/>
+              </a:ext>
+            </a:extLst>
+          </p:cNvPr>
+          <p:cNvCxnSpPr>
+            <a:cxnSpLocks/>
+          </p:cNvCxnSpPr>
+          <p:nvPr/>
+        </p:nvCxnSpPr>
+        <p:spPr>
+          <a:xfrm flipV="1">
+            <a:off x="6723711" y="1499600"/>
+            <a:ext cx="347515" cy="2314763"/>
+          </a:xfrm>
+          <a:prstGeom prst="curvedConnector3">
+            <a:avLst/>
+          </a:prstGeom>
+          <a:ln>
+            <a:tailEnd type="triangle"/>
+          </a:ln>
+        </p:spPr>
+        <p:style>
+          <a:lnRef idx="3">
+            <a:schemeClr val="dk1"/>
+          </a:lnRef>
+          <a:fillRef idx="0">
+            <a:schemeClr val="dk1"/>
+          </a:fillRef>
+          <a:effectRef idx="2">
+            <a:schemeClr val="dk1"/>
+          </a:effectRef>
+          <a:fontRef idx="minor">
+            <a:schemeClr val="tx1"/>
+          </a:fontRef>
+        </p:style>
+      </p:cxnSp>
+      <p:cxnSp>
+        <p:nvCxnSpPr>
+          <p:cNvPr id="27" name="Straight Arrow Connector 26">
+            <a:extLst>
+              <a:ext uri="{FF2B5EF4-FFF2-40B4-BE49-F238E27FC236}">
+                <a16:creationId xmlns:a16="http://schemas.microsoft.com/office/drawing/2014/main" id="{609786C6-2EC1-2A5B-9C5D-EE1B0A57DF9D}"/>
+              </a:ext>
+            </a:extLst>
+          </p:cNvPr>
+          <p:cNvCxnSpPr/>
+          <p:nvPr/>
+        </p:nvCxnSpPr>
+        <p:spPr>
+          <a:xfrm>
+            <a:off x="9210364" y="3026756"/>
+            <a:ext cx="2061" cy="397370"/>
+          </a:xfrm>
+          <a:prstGeom prst="straightConnector1">
+            <a:avLst/>
+          </a:prstGeom>
+          <a:ln>
+            <a:tailEnd type="triangle"/>
+          </a:ln>
+        </p:spPr>
+        <p:style>
+          <a:lnRef idx="3">
+            <a:schemeClr val="dk1"/>
+          </a:lnRef>
+          <a:fillRef idx="0">
+            <a:schemeClr val="dk1"/>
+          </a:fillRef>
+          <a:effectRef idx="2">
+            <a:schemeClr val="dk1"/>
+          </a:effectRef>
+          <a:fontRef idx="minor">
+            <a:schemeClr val="tx1"/>
+          </a:fontRef>
+        </p:style>
+      </p:cxnSp>
+      <p:sp>
+        <p:nvSpPr>
+          <p:cNvPr id="29" name="Rounded Rectangle 28">
+            <a:extLst>
+              <a:ext uri="{FF2B5EF4-FFF2-40B4-BE49-F238E27FC236}">
+                <a16:creationId xmlns:a16="http://schemas.microsoft.com/office/drawing/2014/main" id="{BBEE5F5A-12C1-A087-F24E-72414EDD8A83}"/>
+              </a:ext>
+            </a:extLst>
+          </p:cNvPr>
+          <p:cNvSpPr/>
+          <p:nvPr/>
+        </p:nvSpPr>
+        <p:spPr>
+          <a:xfrm>
+            <a:off x="8626628" y="2224615"/>
+            <a:ext cx="1190624" cy="800099"/>
+          </a:xfrm>
+          <a:prstGeom prst="roundRect">
+            <a:avLst/>
+          </a:prstGeom>
+        </p:spPr>
+        <p:style>
+          <a:lnRef idx="2">
+            <a:schemeClr val="accent5">
+              <a:shade val="50000"/>
+            </a:schemeClr>
+          </a:lnRef>
+          <a:fillRef idx="1">
+            <a:schemeClr val="accent5"/>
+          </a:fillRef>
+          <a:effectRef idx="0">
+            <a:schemeClr val="accent5"/>
+          </a:effectRef>
+          <a:fontRef idx="minor">
+            <a:schemeClr val="lt1"/>
+          </a:fontRef>
+        </p:style>
+        <p:txBody>
+          <a:bodyPr rtlCol="0" anchor="ctr"/>
+          <a:lstStyle/>
+          <a:p>
+            <a:pPr algn="ctr"/>
+            <a:endParaRPr lang="en-US"/>
+          </a:p>
+        </p:txBody>
+      </p:sp>
+      <p:sp>
+        <p:nvSpPr>
+          <p:cNvPr id="30" name="TextBox 29">
+            <a:extLst>
+              <a:ext uri="{FF2B5EF4-FFF2-40B4-BE49-F238E27FC236}">
+                <a16:creationId xmlns:a16="http://schemas.microsoft.com/office/drawing/2014/main" id="{B81455CB-3055-69B1-B489-AAC765347ED0}"/>
+              </a:ext>
+            </a:extLst>
+          </p:cNvPr>
+          <p:cNvSpPr txBox="1"/>
+          <p:nvPr/>
+        </p:nvSpPr>
+        <p:spPr>
+          <a:xfrm>
+            <a:off x="8621226" y="2417762"/>
+            <a:ext cx="1190625" cy="408445"/>
+          </a:xfrm>
+          <a:prstGeom prst="rect">
+            <a:avLst/>
+          </a:prstGeom>
+          <a:noFill/>
+        </p:spPr>
+        <p:txBody>
+          <a:bodyPr wrap="square" rtlCol="0">
+            <a:spAutoFit/>
+          </a:bodyPr>
+          <a:lstStyle/>
+          <a:p>
+            <a:pPr algn="ctr"/>
+            <a:r>
+              <a:rPr lang="en-US" sz="1027" b="1" dirty="0" err="1"/>
+              <a:t>Normalisation</a:t>
+            </a:r>
+            <a:r>
+              <a:rPr lang="en-US" sz="1027" b="1" dirty="0"/>
+              <a:t> block</a:t>
+            </a:r>
+          </a:p>
+        </p:txBody>
+      </p:sp>
+      <p:sp>
+        <p:nvSpPr>
+          <p:cNvPr id="33" name="Rounded Rectangle 32">
+            <a:extLst>
+              <a:ext uri="{FF2B5EF4-FFF2-40B4-BE49-F238E27FC236}">
+                <a16:creationId xmlns:a16="http://schemas.microsoft.com/office/drawing/2014/main" id="{08AC7916-0163-2DCC-2874-E84417ACB0D0}"/>
+              </a:ext>
+            </a:extLst>
+          </p:cNvPr>
+          <p:cNvSpPr/>
+          <p:nvPr/>
+        </p:nvSpPr>
+        <p:spPr>
+          <a:xfrm>
+            <a:off x="4651764" y="4673540"/>
+            <a:ext cx="1190624" cy="800099"/>
+          </a:xfrm>
+          <a:prstGeom prst="roundRect">
+            <a:avLst/>
+          </a:prstGeom>
+        </p:spPr>
+        <p:style>
+          <a:lnRef idx="2">
+            <a:schemeClr val="accent5">
+              <a:shade val="50000"/>
+            </a:schemeClr>
+          </a:lnRef>
+          <a:fillRef idx="1">
+            <a:schemeClr val="accent5"/>
+          </a:fillRef>
+          <a:effectRef idx="0">
+            <a:schemeClr val="accent5"/>
+          </a:effectRef>
+          <a:fontRef idx="minor">
+            <a:schemeClr val="lt1"/>
+          </a:fontRef>
+        </p:style>
+        <p:txBody>
+          <a:bodyPr rtlCol="0" anchor="ctr"/>
+          <a:lstStyle/>
+          <a:p>
+            <a:pPr algn="ctr"/>
+            <a:endParaRPr lang="en-US"/>
+          </a:p>
+        </p:txBody>
+      </p:sp>
+      <p:sp>
+        <p:nvSpPr>
+          <p:cNvPr id="34" name="TextBox 33">
+            <a:extLst>
+              <a:ext uri="{FF2B5EF4-FFF2-40B4-BE49-F238E27FC236}">
+                <a16:creationId xmlns:a16="http://schemas.microsoft.com/office/drawing/2014/main" id="{E81CFDA7-FCFF-C461-E401-63F5A052FECF}"/>
+              </a:ext>
+            </a:extLst>
+          </p:cNvPr>
+          <p:cNvSpPr txBox="1"/>
+          <p:nvPr/>
+        </p:nvSpPr>
+        <p:spPr>
+          <a:xfrm>
+            <a:off x="4607781" y="4710217"/>
+            <a:ext cx="1289818" cy="250390"/>
+          </a:xfrm>
+          <a:prstGeom prst="rect">
+            <a:avLst/>
+          </a:prstGeom>
+          <a:noFill/>
+        </p:spPr>
+        <p:txBody>
+          <a:bodyPr wrap="square" rtlCol="0">
+            <a:spAutoFit/>
+          </a:bodyPr>
+          <a:lstStyle/>
+          <a:p>
+            <a:r>
+              <a:rPr lang="en-US" sz="1027" b="1" dirty="0"/>
+              <a:t>Batch </a:t>
+            </a:r>
+            <a:r>
+              <a:rPr lang="en-US" sz="1027" b="1" dirty="0" err="1"/>
+              <a:t>normalisation</a:t>
+            </a:r>
+            <a:endParaRPr lang="en-US" sz="1027" b="1" dirty="0"/>
+          </a:p>
+        </p:txBody>
+      </p:sp>
+      <p:sp>
+        <p:nvSpPr>
+          <p:cNvPr id="35" name="TextBox 34">
+            <a:extLst>
+              <a:ext uri="{FF2B5EF4-FFF2-40B4-BE49-F238E27FC236}">
+                <a16:creationId xmlns:a16="http://schemas.microsoft.com/office/drawing/2014/main" id="{12673CF2-8A04-60CD-ED03-12CA0A8BB2F3}"/>
+              </a:ext>
+            </a:extLst>
+          </p:cNvPr>
+          <p:cNvSpPr txBox="1"/>
+          <p:nvPr/>
+        </p:nvSpPr>
+        <p:spPr>
+          <a:xfrm>
+            <a:off x="4651588" y="4895698"/>
+            <a:ext cx="1190117" cy="200055"/>
+          </a:xfrm>
+          <a:prstGeom prst="rect">
+            <a:avLst/>
+          </a:prstGeom>
+          <a:noFill/>
+        </p:spPr>
+        <p:txBody>
+          <a:bodyPr wrap="square" rtlCol="0">
+            <a:spAutoFit/>
+          </a:bodyPr>
+          <a:lstStyle/>
+          <a:p>
+            <a:pPr algn="ctr"/>
+            <a:r>
+              <a:rPr lang="en-US" sz="700" dirty="0"/>
+              <a:t>default hyperparameters</a:t>
+            </a:r>
+          </a:p>
+        </p:txBody>
+      </p:sp>
+      <p:sp>
+        <p:nvSpPr>
+          <p:cNvPr id="38" name="Rounded Rectangle 37">
+            <a:extLst>
+              <a:ext uri="{FF2B5EF4-FFF2-40B4-BE49-F238E27FC236}">
+                <a16:creationId xmlns:a16="http://schemas.microsoft.com/office/drawing/2014/main" id="{9980266A-018D-F806-C8A0-5B8B8AD9C13E}"/>
+              </a:ext>
+            </a:extLst>
+          </p:cNvPr>
+          <p:cNvSpPr/>
+          <p:nvPr/>
+        </p:nvSpPr>
+        <p:spPr>
+          <a:xfrm>
+            <a:off x="4657378" y="5870769"/>
+            <a:ext cx="1190624" cy="800099"/>
+          </a:xfrm>
+          <a:prstGeom prst="roundRect">
+            <a:avLst/>
+          </a:prstGeom>
+        </p:spPr>
+        <p:style>
+          <a:lnRef idx="2">
+            <a:schemeClr val="accent5">
+              <a:shade val="50000"/>
+            </a:schemeClr>
+          </a:lnRef>
+          <a:fillRef idx="1">
+            <a:schemeClr val="accent5"/>
+          </a:fillRef>
+          <a:effectRef idx="0">
+            <a:schemeClr val="accent5"/>
+          </a:effectRef>
+          <a:fontRef idx="minor">
+            <a:schemeClr val="lt1"/>
+          </a:fontRef>
+        </p:style>
+        <p:txBody>
+          <a:bodyPr rtlCol="0" anchor="ctr"/>
+          <a:lstStyle/>
+          <a:p>
+            <a:pPr algn="ctr"/>
+            <a:endParaRPr lang="en-US"/>
+          </a:p>
+        </p:txBody>
+      </p:sp>
+      <p:sp>
+        <p:nvSpPr>
+          <p:cNvPr id="39" name="TextBox 38">
+            <a:extLst>
+              <a:ext uri="{FF2B5EF4-FFF2-40B4-BE49-F238E27FC236}">
+                <a16:creationId xmlns:a16="http://schemas.microsoft.com/office/drawing/2014/main" id="{6540F599-6E6A-8852-03D1-BDB73EA9C3AB}"/>
+              </a:ext>
+            </a:extLst>
+          </p:cNvPr>
+          <p:cNvSpPr txBox="1"/>
+          <p:nvPr/>
+        </p:nvSpPr>
+        <p:spPr>
+          <a:xfrm>
+            <a:off x="4879768" y="5927261"/>
+            <a:ext cx="744631" cy="250390"/>
+          </a:xfrm>
+          <a:prstGeom prst="rect">
+            <a:avLst/>
+          </a:prstGeom>
+          <a:noFill/>
+        </p:spPr>
+        <p:txBody>
+          <a:bodyPr wrap="square" rtlCol="0">
+            <a:spAutoFit/>
+          </a:bodyPr>
+          <a:lstStyle/>
+          <a:p>
+            <a:r>
+              <a:rPr lang="en-US" sz="1027" b="1" dirty="0"/>
+              <a:t>Activation</a:t>
+            </a:r>
+          </a:p>
+        </p:txBody>
+      </p:sp>
+      <p:sp>
+        <p:nvSpPr>
+          <p:cNvPr id="40" name="TextBox 39">
+            <a:extLst>
+              <a:ext uri="{FF2B5EF4-FFF2-40B4-BE49-F238E27FC236}">
+                <a16:creationId xmlns:a16="http://schemas.microsoft.com/office/drawing/2014/main" id="{B76F2D95-1DEF-1619-661D-F5541FF2FA17}"/>
+              </a:ext>
+            </a:extLst>
+          </p:cNvPr>
+          <p:cNvSpPr txBox="1"/>
+          <p:nvPr/>
+        </p:nvSpPr>
+        <p:spPr>
+          <a:xfrm>
+            <a:off x="4657202" y="6092927"/>
+            <a:ext cx="1190117" cy="200055"/>
+          </a:xfrm>
+          <a:prstGeom prst="rect">
+            <a:avLst/>
+          </a:prstGeom>
+          <a:noFill/>
+        </p:spPr>
+        <p:txBody>
+          <a:bodyPr wrap="square" rtlCol="0">
+            <a:spAutoFit/>
+          </a:bodyPr>
+          <a:lstStyle/>
+          <a:p>
+            <a:pPr algn="ctr"/>
+            <a:r>
+              <a:rPr lang="en-US" sz="700" dirty="0"/>
+              <a:t>activation = ‘</a:t>
+            </a:r>
+            <a:r>
+              <a:rPr lang="en-US" sz="700" dirty="0" err="1"/>
+              <a:t>relu</a:t>
+            </a:r>
+            <a:r>
+              <a:rPr lang="en-US" sz="700" dirty="0"/>
+              <a:t>’</a:t>
+            </a:r>
+          </a:p>
+        </p:txBody>
+      </p:sp>
+      <p:cxnSp>
+        <p:nvCxnSpPr>
+          <p:cNvPr id="41" name="Straight Arrow Connector 40">
+            <a:extLst>
+              <a:ext uri="{FF2B5EF4-FFF2-40B4-BE49-F238E27FC236}">
+                <a16:creationId xmlns:a16="http://schemas.microsoft.com/office/drawing/2014/main" id="{55AAFA7C-F57B-3707-345C-CD239C9E9DFD}"/>
+              </a:ext>
+            </a:extLst>
+          </p:cNvPr>
+          <p:cNvCxnSpPr/>
+          <p:nvPr/>
+        </p:nvCxnSpPr>
+        <p:spPr>
+          <a:xfrm>
+            <a:off x="5252690" y="5473399"/>
+            <a:ext cx="2061" cy="397370"/>
+          </a:xfrm>
+          <a:prstGeom prst="straightConnector1">
+            <a:avLst/>
+          </a:prstGeom>
+          <a:ln>
+            <a:tailEnd type="triangle"/>
+          </a:ln>
+        </p:spPr>
+        <p:style>
+          <a:lnRef idx="3">
+            <a:schemeClr val="dk1"/>
+          </a:lnRef>
+          <a:fillRef idx="0">
+            <a:schemeClr val="dk1"/>
+          </a:fillRef>
+          <a:effectRef idx="2">
+            <a:schemeClr val="dk1"/>
+          </a:effectRef>
+          <a:fontRef idx="minor">
+            <a:schemeClr val="tx1"/>
+          </a:fontRef>
+        </p:style>
+      </p:cxnSp>
+      <p:sp>
+        <p:nvSpPr>
+          <p:cNvPr id="44" name="Rounded Rectangle 43">
+            <a:extLst>
+              <a:ext uri="{FF2B5EF4-FFF2-40B4-BE49-F238E27FC236}">
+                <a16:creationId xmlns:a16="http://schemas.microsoft.com/office/drawing/2014/main" id="{D3990F23-9ADB-7F78-B3FF-ADAE1B6DD86C}"/>
+              </a:ext>
+            </a:extLst>
+          </p:cNvPr>
+          <p:cNvSpPr/>
+          <p:nvPr/>
+        </p:nvSpPr>
+        <p:spPr>
+          <a:xfrm>
+            <a:off x="2850997" y="5215838"/>
+            <a:ext cx="1190624" cy="800099"/>
+          </a:xfrm>
+          <a:prstGeom prst="roundRect">
+            <a:avLst/>
+          </a:prstGeom>
+        </p:spPr>
+        <p:style>
+          <a:lnRef idx="2">
+            <a:schemeClr val="accent5">
+              <a:shade val="50000"/>
+            </a:schemeClr>
+          </a:lnRef>
+          <a:fillRef idx="1">
+            <a:schemeClr val="accent5"/>
+          </a:fillRef>
+          <a:effectRef idx="0">
+            <a:schemeClr val="accent5"/>
+          </a:effectRef>
+          <a:fontRef idx="minor">
+            <a:schemeClr val="lt1"/>
+          </a:fontRef>
+        </p:style>
+        <p:txBody>
+          <a:bodyPr rtlCol="0" anchor="ctr"/>
+          <a:lstStyle/>
+          <a:p>
+            <a:pPr algn="ctr"/>
+            <a:endParaRPr lang="en-US"/>
+          </a:p>
+        </p:txBody>
+      </p:sp>
+      <p:sp>
+        <p:nvSpPr>
+          <p:cNvPr id="45" name="TextBox 44">
+            <a:extLst>
+              <a:ext uri="{FF2B5EF4-FFF2-40B4-BE49-F238E27FC236}">
+                <a16:creationId xmlns:a16="http://schemas.microsoft.com/office/drawing/2014/main" id="{18A135A3-6A32-9DDD-149D-1819ECA56216}"/>
+              </a:ext>
+            </a:extLst>
+          </p:cNvPr>
+          <p:cNvSpPr txBox="1"/>
+          <p:nvPr/>
+        </p:nvSpPr>
+        <p:spPr>
+          <a:xfrm>
+            <a:off x="2845595" y="5408985"/>
+            <a:ext cx="1190625" cy="408445"/>
+          </a:xfrm>
+          <a:prstGeom prst="rect">
+            <a:avLst/>
+          </a:prstGeom>
+          <a:noFill/>
+        </p:spPr>
+        <p:txBody>
+          <a:bodyPr wrap="square" rtlCol="0">
+            <a:spAutoFit/>
+          </a:bodyPr>
+          <a:lstStyle/>
+          <a:p>
+            <a:pPr algn="ctr"/>
+            <a:r>
+              <a:rPr lang="en-US" sz="1027" b="1" dirty="0" err="1"/>
+              <a:t>Normalisation</a:t>
+            </a:r>
+            <a:r>
+              <a:rPr lang="en-US" sz="1027" b="1" dirty="0"/>
+              <a:t> block</a:t>
+            </a:r>
+          </a:p>
+        </p:txBody>
+      </p:sp>
+    </p:spTree>
+    <p:extLst>
+      <p:ext uri="{BB962C8B-B14F-4D97-AF65-F5344CB8AC3E}">
+        <p14:creationId xmlns:p14="http://schemas.microsoft.com/office/powerpoint/2010/main" val="3702216489"/>
       </p:ext>
     </p:extLst>
   </p:cSld>

</xml_diff>